<commit_message>
Subindo o PDF do FG
</commit_message>
<xml_diff>
--- a/Agro Cane/Tecnologia da Informação/Fluxograma/Fluxograma.pptx
+++ b/Agro Cane/Tecnologia da Informação/Fluxograma/Fluxograma.pptx
@@ -5,7 +5,7 @@
     <p:sldMasterId id="2147483744" r:id="rId1"/>
   </p:sldMasterIdLst>
   <p:sldIdLst>
-    <p:sldId id="258" r:id="rId2"/>
+    <p:sldId id="262" r:id="rId2"/>
   </p:sldIdLst>
   <p:sldSz cx="8999538" cy="9720263"/>
   <p:notesSz cx="6858000" cy="9144000"/>
@@ -104,6 +104,11 @@
       </a:defRPr>
     </a:lvl9pPr>
   </p:defaultTextStyle>
+  <p:extLst>
+    <p:ext uri="{EFAFB233-063F-42B5-8137-9DF3F51BA10A}">
+      <p15:sldGuideLst xmlns:p15="http://schemas.microsoft.com/office/powerpoint/2012/main"/>
+    </p:ext>
+  </p:extLst>
 </p:presentation>
 </file>
 
@@ -238,7 +243,7 @@
           <a:p>
             <a:fld id="{A6BC64F7-5FB0-4183-AA12-A26509D9C920}" type="datetimeFigureOut">
               <a:rPr lang="pt-BR" smtClean="0"/>
-              <a:t>11/05/2021</a:t>
+              <a:t>18/05/2021</a:t>
             </a:fld>
             <a:endParaRPr lang="pt-BR"/>
           </a:p>
@@ -408,7 +413,7 @@
           <a:p>
             <a:fld id="{A6BC64F7-5FB0-4183-AA12-A26509D9C920}" type="datetimeFigureOut">
               <a:rPr lang="pt-BR" smtClean="0"/>
-              <a:t>11/05/2021</a:t>
+              <a:t>18/05/2021</a:t>
             </a:fld>
             <a:endParaRPr lang="pt-BR"/>
           </a:p>
@@ -588,7 +593,7 @@
           <a:p>
             <a:fld id="{A6BC64F7-5FB0-4183-AA12-A26509D9C920}" type="datetimeFigureOut">
               <a:rPr lang="pt-BR" smtClean="0"/>
-              <a:t>11/05/2021</a:t>
+              <a:t>18/05/2021</a:t>
             </a:fld>
             <a:endParaRPr lang="pt-BR"/>
           </a:p>
@@ -758,7 +763,7 @@
           <a:p>
             <a:fld id="{A6BC64F7-5FB0-4183-AA12-A26509D9C920}" type="datetimeFigureOut">
               <a:rPr lang="pt-BR" smtClean="0"/>
-              <a:t>11/05/2021</a:t>
+              <a:t>18/05/2021</a:t>
             </a:fld>
             <a:endParaRPr lang="pt-BR"/>
           </a:p>
@@ -1002,7 +1007,7 @@
           <a:p>
             <a:fld id="{A6BC64F7-5FB0-4183-AA12-A26509D9C920}" type="datetimeFigureOut">
               <a:rPr lang="pt-BR" smtClean="0"/>
-              <a:t>11/05/2021</a:t>
+              <a:t>18/05/2021</a:t>
             </a:fld>
             <a:endParaRPr lang="pt-BR"/>
           </a:p>
@@ -1234,7 +1239,7 @@
           <a:p>
             <a:fld id="{A6BC64F7-5FB0-4183-AA12-A26509D9C920}" type="datetimeFigureOut">
               <a:rPr lang="pt-BR" smtClean="0"/>
-              <a:t>11/05/2021</a:t>
+              <a:t>18/05/2021</a:t>
             </a:fld>
             <a:endParaRPr lang="pt-BR"/>
           </a:p>
@@ -1601,7 +1606,7 @@
           <a:p>
             <a:fld id="{A6BC64F7-5FB0-4183-AA12-A26509D9C920}" type="datetimeFigureOut">
               <a:rPr lang="pt-BR" smtClean="0"/>
-              <a:t>11/05/2021</a:t>
+              <a:t>18/05/2021</a:t>
             </a:fld>
             <a:endParaRPr lang="pt-BR"/>
           </a:p>
@@ -1719,7 +1724,7 @@
           <a:p>
             <a:fld id="{A6BC64F7-5FB0-4183-AA12-A26509D9C920}" type="datetimeFigureOut">
               <a:rPr lang="pt-BR" smtClean="0"/>
-              <a:t>11/05/2021</a:t>
+              <a:t>18/05/2021</a:t>
             </a:fld>
             <a:endParaRPr lang="pt-BR"/>
           </a:p>
@@ -1814,7 +1819,7 @@
           <a:p>
             <a:fld id="{A6BC64F7-5FB0-4183-AA12-A26509D9C920}" type="datetimeFigureOut">
               <a:rPr lang="pt-BR" smtClean="0"/>
-              <a:t>11/05/2021</a:t>
+              <a:t>18/05/2021</a:t>
             </a:fld>
             <a:endParaRPr lang="pt-BR"/>
           </a:p>
@@ -2091,7 +2096,7 @@
           <a:p>
             <a:fld id="{A6BC64F7-5FB0-4183-AA12-A26509D9C920}" type="datetimeFigureOut">
               <a:rPr lang="pt-BR" smtClean="0"/>
-              <a:t>11/05/2021</a:t>
+              <a:t>18/05/2021</a:t>
             </a:fld>
             <a:endParaRPr lang="pt-BR"/>
           </a:p>
@@ -2348,7 +2353,7 @@
           <a:p>
             <a:fld id="{A6BC64F7-5FB0-4183-AA12-A26509D9C920}" type="datetimeFigureOut">
               <a:rPr lang="pt-BR" smtClean="0"/>
-              <a:t>11/05/2021</a:t>
+              <a:t>18/05/2021</a:t>
             </a:fld>
             <a:endParaRPr lang="pt-BR"/>
           </a:p>
@@ -2561,7 +2566,7 @@
           <a:p>
             <a:fld id="{A6BC64F7-5FB0-4183-AA12-A26509D9C920}" type="datetimeFigureOut">
               <a:rPr lang="pt-BR" smtClean="0"/>
-              <a:t>11/05/2021</a:t>
+              <a:t>18/05/2021</a:t>
             </a:fld>
             <a:endParaRPr lang="pt-BR"/>
           </a:p>
@@ -2968,6 +2973,196 @@
       </p:grpSpPr>
       <p:grpSp>
         <p:nvGrpSpPr>
+          <p:cNvPr id="122" name="Agrupar 121">
+            <a:extLst>
+              <a:ext uri="{FF2B5EF4-FFF2-40B4-BE49-F238E27FC236}">
+                <a16:creationId xmlns:a16="http://schemas.microsoft.com/office/drawing/2014/main" id="{E7ADE3FF-8ACD-4DD4-8EFF-29B88CE9FE08}"/>
+              </a:ext>
+            </a:extLst>
+          </p:cNvPr>
+          <p:cNvGrpSpPr/>
+          <p:nvPr/>
+        </p:nvGrpSpPr>
+        <p:grpSpPr>
+          <a:xfrm>
+            <a:off x="238127" y="6855564"/>
+            <a:ext cx="8464666" cy="2296055"/>
+            <a:chOff x="238127" y="3878607"/>
+            <a:chExt cx="8464666" cy="4866931"/>
+          </a:xfrm>
+        </p:grpSpPr>
+        <p:sp>
+          <p:nvSpPr>
+            <p:cNvPr id="123" name="Retângulo 122">
+              <a:extLst>
+                <a:ext uri="{FF2B5EF4-FFF2-40B4-BE49-F238E27FC236}">
+                  <a16:creationId xmlns:a16="http://schemas.microsoft.com/office/drawing/2014/main" id="{EE8443BF-2673-4E3E-9F00-15D3862AD93A}"/>
+                </a:ext>
+              </a:extLst>
+            </p:cNvPr>
+            <p:cNvSpPr/>
+            <p:nvPr/>
+          </p:nvSpPr>
+          <p:spPr>
+            <a:xfrm>
+              <a:off x="724696" y="3878607"/>
+              <a:ext cx="7978097" cy="4866931"/>
+            </a:xfrm>
+            <a:prstGeom prst="rect">
+              <a:avLst/>
+            </a:prstGeom>
+            <a:solidFill>
+              <a:schemeClr val="bg1">
+                <a:lumMod val="95000"/>
+              </a:schemeClr>
+            </a:solidFill>
+            <a:ln>
+              <a:solidFill>
+                <a:schemeClr val="tx1"/>
+              </a:solidFill>
+            </a:ln>
+          </p:spPr>
+          <p:style>
+            <a:lnRef idx="2">
+              <a:schemeClr val="accent1">
+                <a:shade val="50000"/>
+              </a:schemeClr>
+            </a:lnRef>
+            <a:fillRef idx="1">
+              <a:schemeClr val="accent1"/>
+            </a:fillRef>
+            <a:effectRef idx="0">
+              <a:schemeClr val="accent1"/>
+            </a:effectRef>
+            <a:fontRef idx="minor">
+              <a:schemeClr val="lt1"/>
+            </a:fontRef>
+          </p:style>
+          <p:txBody>
+            <a:bodyPr rtlCol="0" anchor="ctr"/>
+            <a:lstStyle/>
+            <a:p>
+              <a:pPr algn="ctr"/>
+              <a:endParaRPr lang="pt-BR"/>
+            </a:p>
+          </p:txBody>
+        </p:sp>
+        <p:grpSp>
+          <p:nvGrpSpPr>
+            <p:cNvPr id="124" name="Agrupar 123">
+              <a:extLst>
+                <a:ext uri="{FF2B5EF4-FFF2-40B4-BE49-F238E27FC236}">
+                  <a16:creationId xmlns:a16="http://schemas.microsoft.com/office/drawing/2014/main" id="{2F09A8C5-E5A3-4DCD-98B5-05CF60CD7140}"/>
+                </a:ext>
+              </a:extLst>
+            </p:cNvPr>
+            <p:cNvGrpSpPr/>
+            <p:nvPr/>
+          </p:nvGrpSpPr>
+          <p:grpSpPr>
+            <a:xfrm>
+              <a:off x="238127" y="3878607"/>
+              <a:ext cx="486569" cy="4866931"/>
+              <a:chOff x="219075" y="590548"/>
+              <a:chExt cx="486569" cy="3495677"/>
+            </a:xfrm>
+          </p:grpSpPr>
+          <p:sp>
+            <p:nvSpPr>
+              <p:cNvPr id="125" name="Retângulo 124">
+                <a:extLst>
+                  <a:ext uri="{FF2B5EF4-FFF2-40B4-BE49-F238E27FC236}">
+                    <a16:creationId xmlns:a16="http://schemas.microsoft.com/office/drawing/2014/main" id="{2BFD3264-D3B7-4372-8A25-ADD9B1E48D38}"/>
+                  </a:ext>
+                </a:extLst>
+              </p:cNvPr>
+              <p:cNvSpPr/>
+              <p:nvPr/>
+            </p:nvSpPr>
+            <p:spPr>
+              <a:xfrm>
+                <a:off x="219075" y="590548"/>
+                <a:ext cx="486569" cy="3495677"/>
+              </a:xfrm>
+              <a:prstGeom prst="rect">
+                <a:avLst/>
+              </a:prstGeom>
+              <a:solidFill>
+                <a:schemeClr val="bg2">
+                  <a:lumMod val="75000"/>
+                </a:schemeClr>
+              </a:solidFill>
+              <a:ln>
+                <a:solidFill>
+                  <a:schemeClr val="tx1"/>
+                </a:solidFill>
+              </a:ln>
+            </p:spPr>
+            <p:style>
+              <a:lnRef idx="2">
+                <a:schemeClr val="accent1">
+                  <a:shade val="50000"/>
+                </a:schemeClr>
+              </a:lnRef>
+              <a:fillRef idx="1">
+                <a:schemeClr val="accent1"/>
+              </a:fillRef>
+              <a:effectRef idx="0">
+                <a:schemeClr val="accent1"/>
+              </a:effectRef>
+              <a:fontRef idx="minor">
+                <a:schemeClr val="lt1"/>
+              </a:fontRef>
+            </p:style>
+            <p:txBody>
+              <a:bodyPr rtlCol="0" anchor="ctr"/>
+              <a:lstStyle/>
+              <a:p>
+                <a:pPr algn="ctr"/>
+                <a:endParaRPr lang="pt-BR" dirty="0"/>
+              </a:p>
+            </p:txBody>
+          </p:sp>
+          <p:sp>
+            <p:nvSpPr>
+              <p:cNvPr id="126" name="CaixaDeTexto 125">
+                <a:extLst>
+                  <a:ext uri="{FF2B5EF4-FFF2-40B4-BE49-F238E27FC236}">
+                    <a16:creationId xmlns:a16="http://schemas.microsoft.com/office/drawing/2014/main" id="{BDCEB9EC-749A-4AA0-A035-90091D3C773F}"/>
+                  </a:ext>
+                </a:extLst>
+              </p:cNvPr>
+              <p:cNvSpPr txBox="1"/>
+              <p:nvPr/>
+            </p:nvSpPr>
+            <p:spPr>
+              <a:xfrm rot="16200000">
+                <a:off x="-1285478" y="2153720"/>
+                <a:ext cx="3495676" cy="369332"/>
+              </a:xfrm>
+              <a:prstGeom prst="rect">
+                <a:avLst/>
+              </a:prstGeom>
+              <a:noFill/>
+            </p:spPr>
+            <p:txBody>
+              <a:bodyPr wrap="square" rtlCol="0">
+                <a:spAutoFit/>
+              </a:bodyPr>
+              <a:lstStyle/>
+              <a:p>
+                <a:pPr algn="ctr"/>
+                <a:r>
+                  <a:rPr lang="pt-BR" dirty="0"/>
+                  <a:t>N3</a:t>
+                </a:r>
+              </a:p>
+            </p:txBody>
+          </p:sp>
+        </p:grpSp>
+      </p:grpSp>
+      <p:grpSp>
+        <p:nvGrpSpPr>
           <p:cNvPr id="22" name="Agrupar 21">
             <a:extLst>
               <a:ext uri="{FF2B5EF4-FFF2-40B4-BE49-F238E27FC236}">
@@ -2980,8 +3175,8 @@
         </p:nvGrpSpPr>
         <p:grpSpPr>
           <a:xfrm>
-            <a:off x="238127" y="3878607"/>
-            <a:ext cx="8464666" cy="4866931"/>
+            <a:off x="238127" y="4635533"/>
+            <a:ext cx="8464666" cy="2220030"/>
             <a:chOff x="238127" y="3878607"/>
             <a:chExt cx="8464666" cy="4866931"/>
           </a:xfrm>
@@ -3149,7 +3344,7 @@
                 <a:pPr algn="ctr"/>
                 <a:r>
                   <a:rPr lang="pt-BR" dirty="0"/>
-                  <a:t>Técnico</a:t>
+                  <a:t>N2</a:t>
                 </a:r>
               </a:p>
             </p:txBody>
@@ -3170,8 +3365,8 @@
         </p:nvGrpSpPr>
         <p:grpSpPr>
           <a:xfrm>
-            <a:off x="238127" y="1165223"/>
-            <a:ext cx="8464666" cy="2706701"/>
+            <a:off x="238127" y="1094633"/>
+            <a:ext cx="8464666" cy="3537294"/>
             <a:chOff x="238127" y="1165223"/>
             <a:chExt cx="8464666" cy="2706701"/>
           </a:xfrm>
@@ -3339,7 +3534,7 @@
                 <a:pPr algn="ctr"/>
                 <a:r>
                   <a:rPr lang="pt-BR" dirty="0"/>
-                  <a:t>Usuário</a:t>
+                  <a:t>N1</a:t>
                 </a:r>
               </a:p>
             </p:txBody>
@@ -3360,7 +3555,7 @@
         </p:nvSpPr>
         <p:spPr>
           <a:xfrm>
-            <a:off x="962025" y="1355726"/>
+            <a:off x="962025" y="1285137"/>
             <a:ext cx="1762124" cy="476251"/>
           </a:xfrm>
           <a:prstGeom prst="flowChartTerminator">
@@ -3426,7 +3621,7 @@
         </p:nvSpPr>
         <p:spPr>
           <a:xfrm>
-            <a:off x="1104900" y="2041525"/>
+            <a:off x="1104900" y="2686937"/>
             <a:ext cx="1476377" cy="723900"/>
           </a:xfrm>
           <a:prstGeom prst="flowChartDecision">
@@ -3490,14 +3685,14 @@
           <p:cNvCxnSpPr>
             <a:cxnSpLocks/>
             <a:stCxn id="16" idx="2"/>
-            <a:endCxn id="18" idx="0"/>
+            <a:endCxn id="68" idx="0"/>
           </p:cNvCxnSpPr>
           <p:nvPr/>
         </p:nvCxnSpPr>
         <p:spPr>
-          <a:xfrm>
-            <a:off x="1843087" y="1831975"/>
-            <a:ext cx="0" cy="209550"/>
+          <a:xfrm flipH="1">
+            <a:off x="1834874" y="1761388"/>
+            <a:ext cx="8213" cy="240047"/>
           </a:xfrm>
           <a:prstGeom prst="straightConnector1">
             <a:avLst/>
@@ -3535,7 +3730,7 @@
         </p:nvSpPr>
         <p:spPr>
           <a:xfrm>
-            <a:off x="1104900" y="2974975"/>
+            <a:off x="1104900" y="3620387"/>
             <a:ext cx="1476377" cy="723900"/>
           </a:xfrm>
           <a:prstGeom prst="flowChartDecision">
@@ -3582,7 +3777,7 @@
                   <a:schemeClr val="tx1"/>
                 </a:solidFill>
               </a:rPr>
-              <a:t>Sensor está enviando dados?</a:t>
+              <a:t>Problemas no cadastro?</a:t>
             </a:r>
           </a:p>
         </p:txBody>
@@ -3604,7 +3799,7 @@
         </p:nvCxnSpPr>
         <p:spPr>
           <a:xfrm>
-            <a:off x="1843087" y="2765425"/>
+            <a:off x="1843087" y="3410837"/>
             <a:ext cx="0" cy="209550"/>
           </a:xfrm>
           <a:prstGeom prst="straightConnector1">
@@ -3643,7 +3838,7 @@
         </p:nvSpPr>
         <p:spPr>
           <a:xfrm>
-            <a:off x="1850234" y="2739395"/>
+            <a:off x="1850234" y="3384807"/>
             <a:ext cx="732631" cy="261610"/>
           </a:xfrm>
           <a:prstGeom prst="rect">
@@ -3680,7 +3875,7 @@
         </p:nvCxnSpPr>
         <p:spPr>
           <a:xfrm>
-            <a:off x="2591594" y="2403475"/>
+            <a:off x="2591594" y="3048887"/>
             <a:ext cx="380204" cy="0"/>
           </a:xfrm>
           <a:prstGeom prst="straightConnector1">
@@ -3719,7 +3914,7 @@
         </p:nvSpPr>
         <p:spPr>
           <a:xfrm>
-            <a:off x="2547149" y="2154880"/>
+            <a:off x="2547149" y="2800292"/>
             <a:ext cx="732631" cy="261610"/>
           </a:xfrm>
           <a:prstGeom prst="rect">
@@ -3754,7 +3949,7 @@
         </p:nvSpPr>
         <p:spPr>
           <a:xfrm>
-            <a:off x="2971798" y="2154880"/>
+            <a:off x="2971798" y="2800292"/>
             <a:ext cx="1476376" cy="505770"/>
           </a:xfrm>
           <a:prstGeom prst="rect">
@@ -3801,7 +3996,7 @@
                   <a:schemeClr val="tx1"/>
                 </a:solidFill>
               </a:rPr>
-              <a:t>Verificar conexão com a internet</a:t>
+              <a:t>Verificar conexão com a internet e cabeamento</a:t>
             </a:r>
           </a:p>
         </p:txBody>
@@ -3820,7 +4015,7 @@
         </p:nvSpPr>
         <p:spPr>
           <a:xfrm>
-            <a:off x="1840707" y="3963607"/>
+            <a:off x="1782151" y="4370317"/>
             <a:ext cx="732631" cy="261610"/>
           </a:xfrm>
           <a:prstGeom prst="rect">
@@ -3841,12 +4036,53 @@
           </a:p>
         </p:txBody>
       </p:sp>
-      <p:sp>
-        <p:nvSpPr>
-          <p:cNvPr id="60" name="Retângulo 59">
+      <p:cxnSp>
+        <p:nvCxnSpPr>
+          <p:cNvPr id="69" name="Conector de Seta Reta 68">
             <a:extLst>
               <a:ext uri="{FF2B5EF4-FFF2-40B4-BE49-F238E27FC236}">
-                <a16:creationId xmlns:a16="http://schemas.microsoft.com/office/drawing/2014/main" id="{4C61DEC5-77E6-4507-9710-F1DA6F6DC39C}"/>
+                <a16:creationId xmlns:a16="http://schemas.microsoft.com/office/drawing/2014/main" id="{B0E43D43-6EE1-4A87-80B6-129F9AE865EC}"/>
+              </a:ext>
+            </a:extLst>
+          </p:cNvPr>
+          <p:cNvCxnSpPr>
+            <a:cxnSpLocks/>
+          </p:cNvCxnSpPr>
+          <p:nvPr/>
+        </p:nvCxnSpPr>
+        <p:spPr>
+          <a:xfrm>
+            <a:off x="2547149" y="8503266"/>
+            <a:ext cx="476247" cy="17"/>
+          </a:xfrm>
+          <a:prstGeom prst="straightConnector1">
+            <a:avLst/>
+          </a:prstGeom>
+          <a:ln>
+            <a:tailEnd type="triangle"/>
+          </a:ln>
+        </p:spPr>
+        <p:style>
+          <a:lnRef idx="1">
+            <a:schemeClr val="accent1"/>
+          </a:lnRef>
+          <a:fillRef idx="0">
+            <a:schemeClr val="accent1"/>
+          </a:fillRef>
+          <a:effectRef idx="0">
+            <a:schemeClr val="accent1"/>
+          </a:effectRef>
+          <a:fontRef idx="minor">
+            <a:schemeClr val="tx1"/>
+          </a:fontRef>
+        </p:style>
+      </p:cxnSp>
+      <p:sp>
+        <p:nvSpPr>
+          <p:cNvPr id="77" name="Fluxograma: Decisão 76">
+            <a:extLst>
+              <a:ext uri="{FF2B5EF4-FFF2-40B4-BE49-F238E27FC236}">
+                <a16:creationId xmlns:a16="http://schemas.microsoft.com/office/drawing/2014/main" id="{773DCD19-9830-4993-92E5-AEE17FDE0490}"/>
               </a:ext>
             </a:extLst>
           </p:cNvPr>
@@ -3855,73 +4091,7 @@
         </p:nvSpPr>
         <p:spPr>
           <a:xfrm>
-            <a:off x="1102520" y="4355154"/>
-            <a:ext cx="1476376" cy="505770"/>
-          </a:xfrm>
-          <a:prstGeom prst="rect">
-            <a:avLst/>
-          </a:prstGeom>
-          <a:solidFill>
-            <a:schemeClr val="accent1">
-              <a:lumMod val="40000"/>
-              <a:lumOff val="60000"/>
-            </a:schemeClr>
-          </a:solidFill>
-          <a:ln w="19050">
-            <a:solidFill>
-              <a:schemeClr val="accent1">
-                <a:lumMod val="75000"/>
-              </a:schemeClr>
-            </a:solidFill>
-          </a:ln>
-        </p:spPr>
-        <p:style>
-          <a:lnRef idx="2">
-            <a:schemeClr val="accent1">
-              <a:shade val="50000"/>
-            </a:schemeClr>
-          </a:lnRef>
-          <a:fillRef idx="1">
-            <a:schemeClr val="accent1"/>
-          </a:fillRef>
-          <a:effectRef idx="0">
-            <a:schemeClr val="accent1"/>
-          </a:effectRef>
-          <a:fontRef idx="minor">
-            <a:schemeClr val="lt1"/>
-          </a:fontRef>
-        </p:style>
-        <p:txBody>
-          <a:bodyPr rtlCol="0" anchor="ctr"/>
-          <a:lstStyle/>
-          <a:p>
-            <a:pPr algn="ctr"/>
-            <a:r>
-              <a:rPr lang="pt-BR" sz="900" dirty="0">
-                <a:solidFill>
-                  <a:schemeClr val="tx1"/>
-                </a:solidFill>
-              </a:rPr>
-              <a:t>Contatar Suporte</a:t>
-            </a:r>
-          </a:p>
-        </p:txBody>
-      </p:sp>
-      <p:sp>
-        <p:nvSpPr>
-          <p:cNvPr id="67" name="Fluxograma: Decisão 66">
-            <a:extLst>
-              <a:ext uri="{FF2B5EF4-FFF2-40B4-BE49-F238E27FC236}">
-                <a16:creationId xmlns:a16="http://schemas.microsoft.com/office/drawing/2014/main" id="{AC9CFC65-A8F0-4880-BE1C-319374A2A526}"/>
-              </a:ext>
-            </a:extLst>
-          </p:cNvPr>
-          <p:cNvSpPr/>
-          <p:nvPr/>
-        </p:nvSpPr>
-        <p:spPr>
-          <a:xfrm>
-            <a:off x="1104900" y="5339385"/>
+            <a:off x="4984717" y="3600669"/>
             <a:ext cx="1476377" cy="723900"/>
           </a:xfrm>
           <a:prstGeom prst="flowChartDecision">
@@ -3968,211 +4138,6 @@
                   <a:schemeClr val="tx1"/>
                 </a:solidFill>
               </a:rPr>
-              <a:t>Sensor danificado?</a:t>
-            </a:r>
-          </a:p>
-        </p:txBody>
-      </p:sp>
-      <p:cxnSp>
-        <p:nvCxnSpPr>
-          <p:cNvPr id="69" name="Conector de Seta Reta 68">
-            <a:extLst>
-              <a:ext uri="{FF2B5EF4-FFF2-40B4-BE49-F238E27FC236}">
-                <a16:creationId xmlns:a16="http://schemas.microsoft.com/office/drawing/2014/main" id="{B0E43D43-6EE1-4A87-80B6-129F9AE865EC}"/>
-              </a:ext>
-            </a:extLst>
-          </p:cNvPr>
-          <p:cNvCxnSpPr>
-            <a:cxnSpLocks/>
-            <a:stCxn id="67" idx="3"/>
-            <a:endCxn id="71" idx="1"/>
-          </p:cNvCxnSpPr>
-          <p:nvPr/>
-        </p:nvCxnSpPr>
-        <p:spPr>
-          <a:xfrm>
-            <a:off x="2581277" y="5701335"/>
-            <a:ext cx="476247" cy="17"/>
-          </a:xfrm>
-          <a:prstGeom prst="straightConnector1">
-            <a:avLst/>
-          </a:prstGeom>
-          <a:ln>
-            <a:tailEnd type="triangle"/>
-          </a:ln>
-        </p:spPr>
-        <p:style>
-          <a:lnRef idx="1">
-            <a:schemeClr val="accent1"/>
-          </a:lnRef>
-          <a:fillRef idx="0">
-            <a:schemeClr val="accent1"/>
-          </a:fillRef>
-          <a:effectRef idx="0">
-            <a:schemeClr val="accent1"/>
-          </a:effectRef>
-          <a:fontRef idx="minor">
-            <a:schemeClr val="tx1"/>
-          </a:fontRef>
-        </p:style>
-      </p:cxnSp>
-      <p:sp>
-        <p:nvSpPr>
-          <p:cNvPr id="70" name="CaixaDeTexto 69">
-            <a:extLst>
-              <a:ext uri="{FF2B5EF4-FFF2-40B4-BE49-F238E27FC236}">
-                <a16:creationId xmlns:a16="http://schemas.microsoft.com/office/drawing/2014/main" id="{227F8914-9A0F-465D-BDF6-B52A599514F4}"/>
-              </a:ext>
-            </a:extLst>
-          </p:cNvPr>
-          <p:cNvSpPr txBox="1"/>
-          <p:nvPr/>
-        </p:nvSpPr>
-        <p:spPr>
-          <a:xfrm>
-            <a:off x="2527391" y="5431486"/>
-            <a:ext cx="732631" cy="261610"/>
-          </a:xfrm>
-          <a:prstGeom prst="rect">
-            <a:avLst/>
-          </a:prstGeom>
-          <a:noFill/>
-        </p:spPr>
-        <p:txBody>
-          <a:bodyPr wrap="square" rtlCol="0">
-            <a:spAutoFit/>
-          </a:bodyPr>
-          <a:lstStyle/>
-          <a:p>
-            <a:r>
-              <a:rPr lang="pt-BR" sz="1100" b="1" dirty="0"/>
-              <a:t>Sim</a:t>
-            </a:r>
-          </a:p>
-        </p:txBody>
-      </p:sp>
-      <p:sp>
-        <p:nvSpPr>
-          <p:cNvPr id="71" name="Fluxograma: Processo Predefinido 70">
-            <a:extLst>
-              <a:ext uri="{FF2B5EF4-FFF2-40B4-BE49-F238E27FC236}">
-                <a16:creationId xmlns:a16="http://schemas.microsoft.com/office/drawing/2014/main" id="{DF6390B3-6981-439E-B711-3912015F47E2}"/>
-              </a:ext>
-            </a:extLst>
-          </p:cNvPr>
-          <p:cNvSpPr/>
-          <p:nvPr/>
-        </p:nvSpPr>
-        <p:spPr>
-          <a:xfrm>
-            <a:off x="3057524" y="5339402"/>
-            <a:ext cx="1343024" cy="723900"/>
-          </a:xfrm>
-          <a:prstGeom prst="flowChartPredefinedProcess">
-            <a:avLst/>
-          </a:prstGeom>
-          <a:solidFill>
-            <a:srgbClr val="B4C7E7"/>
-          </a:solidFill>
-          <a:ln w="19050">
-            <a:solidFill>
-              <a:srgbClr val="2F5597"/>
-            </a:solidFill>
-          </a:ln>
-        </p:spPr>
-        <p:style>
-          <a:lnRef idx="2">
-            <a:schemeClr val="accent1">
-              <a:shade val="50000"/>
-            </a:schemeClr>
-          </a:lnRef>
-          <a:fillRef idx="1">
-            <a:schemeClr val="accent1"/>
-          </a:fillRef>
-          <a:effectRef idx="0">
-            <a:schemeClr val="accent1"/>
-          </a:effectRef>
-          <a:fontRef idx="minor">
-            <a:schemeClr val="lt1"/>
-          </a:fontRef>
-        </p:style>
-        <p:txBody>
-          <a:bodyPr rtlCol="0" anchor="ctr"/>
-          <a:lstStyle/>
-          <a:p>
-            <a:pPr algn="ctr"/>
-            <a:r>
-              <a:rPr lang="pt-BR" sz="900" dirty="0">
-                <a:solidFill>
-                  <a:schemeClr val="tx1"/>
-                </a:solidFill>
-              </a:rPr>
-              <a:t>Trocar sensor</a:t>
-            </a:r>
-          </a:p>
-        </p:txBody>
-      </p:sp>
-      <p:sp>
-        <p:nvSpPr>
-          <p:cNvPr id="77" name="Fluxograma: Decisão 76">
-            <a:extLst>
-              <a:ext uri="{FF2B5EF4-FFF2-40B4-BE49-F238E27FC236}">
-                <a16:creationId xmlns:a16="http://schemas.microsoft.com/office/drawing/2014/main" id="{773DCD19-9830-4993-92E5-AEE17FDE0490}"/>
-              </a:ext>
-            </a:extLst>
-          </p:cNvPr>
-          <p:cNvSpPr/>
-          <p:nvPr/>
-        </p:nvSpPr>
-        <p:spPr>
-          <a:xfrm>
-            <a:off x="4999829" y="2972115"/>
-            <a:ext cx="1476377" cy="723900"/>
-          </a:xfrm>
-          <a:prstGeom prst="flowChartDecision">
-            <a:avLst/>
-          </a:prstGeom>
-          <a:solidFill>
-            <a:schemeClr val="accent1">
-              <a:lumMod val="40000"/>
-              <a:lumOff val="60000"/>
-            </a:schemeClr>
-          </a:solidFill>
-          <a:ln w="19050">
-            <a:solidFill>
-              <a:schemeClr val="accent1">
-                <a:lumMod val="75000"/>
-              </a:schemeClr>
-            </a:solidFill>
-          </a:ln>
-        </p:spPr>
-        <p:style>
-          <a:lnRef idx="2">
-            <a:schemeClr val="accent1">
-              <a:shade val="50000"/>
-            </a:schemeClr>
-          </a:lnRef>
-          <a:fillRef idx="1">
-            <a:schemeClr val="accent1"/>
-          </a:fillRef>
-          <a:effectRef idx="0">
-            <a:schemeClr val="accent1"/>
-          </a:effectRef>
-          <a:fontRef idx="minor">
-            <a:schemeClr val="lt1"/>
-          </a:fontRef>
-        </p:style>
-        <p:txBody>
-          <a:bodyPr rtlCol="0" anchor="ctr"/>
-          <a:lstStyle/>
-          <a:p>
-            <a:pPr algn="ctr"/>
-            <a:r>
-              <a:rPr lang="pt-BR" sz="900" dirty="0">
-                <a:solidFill>
-                  <a:schemeClr val="tx1"/>
-                </a:solidFill>
-              </a:rPr>
               <a:t>Funcionou</a:t>
             </a:r>
           </a:p>
@@ -4194,7 +4159,7 @@
         </p:nvCxnSpPr>
         <p:spPr>
           <a:xfrm>
-            <a:off x="6455537" y="3334306"/>
+            <a:off x="6455537" y="3956858"/>
             <a:ext cx="380204" cy="0"/>
           </a:xfrm>
           <a:prstGeom prst="straightConnector1">
@@ -4233,7 +4198,7 @@
         </p:nvSpPr>
         <p:spPr>
           <a:xfrm>
-            <a:off x="6413926" y="3085711"/>
+            <a:off x="6428067" y="3731597"/>
             <a:ext cx="732631" cy="261610"/>
           </a:xfrm>
           <a:prstGeom prst="rect">
@@ -4268,7 +4233,7 @@
         </p:nvSpPr>
         <p:spPr>
           <a:xfrm>
-            <a:off x="6829027" y="3104905"/>
+            <a:off x="6835741" y="3724493"/>
             <a:ext cx="1762124" cy="476251"/>
           </a:xfrm>
           <a:prstGeom prst="flowChartTerminator">
@@ -4335,9 +4300,9 @@
           <p:nvPr/>
         </p:nvCxnSpPr>
         <p:spPr>
-          <a:xfrm flipH="1">
-            <a:off x="4718791" y="2403475"/>
-            <a:ext cx="3236" cy="930707"/>
+          <a:xfrm>
+            <a:off x="4722027" y="3048887"/>
+            <a:ext cx="0" cy="917851"/>
           </a:xfrm>
           <a:prstGeom prst="line">
             <a:avLst/>
@@ -4375,54 +4340,12 @@
         </p:nvCxnSpPr>
         <p:spPr>
           <a:xfrm flipH="1">
-            <a:off x="4448174" y="2403474"/>
+            <a:off x="4448174" y="3048886"/>
             <a:ext cx="272235" cy="4291"/>
           </a:xfrm>
           <a:prstGeom prst="line">
             <a:avLst/>
           </a:prstGeom>
-        </p:spPr>
-        <p:style>
-          <a:lnRef idx="1">
-            <a:schemeClr val="accent1"/>
-          </a:lnRef>
-          <a:fillRef idx="0">
-            <a:schemeClr val="accent1"/>
-          </a:fillRef>
-          <a:effectRef idx="0">
-            <a:schemeClr val="accent1"/>
-          </a:effectRef>
-          <a:fontRef idx="minor">
-            <a:schemeClr val="tx1"/>
-          </a:fontRef>
-        </p:style>
-      </p:cxnSp>
-      <p:cxnSp>
-        <p:nvCxnSpPr>
-          <p:cNvPr id="141" name="Conector de Seta Reta 140">
-            <a:extLst>
-              <a:ext uri="{FF2B5EF4-FFF2-40B4-BE49-F238E27FC236}">
-                <a16:creationId xmlns:a16="http://schemas.microsoft.com/office/drawing/2014/main" id="{76FF279F-B6CA-4E8C-9D92-A24B960C1D42}"/>
-              </a:ext>
-            </a:extLst>
-          </p:cNvPr>
-          <p:cNvCxnSpPr>
-            <a:cxnSpLocks/>
-            <a:stCxn id="60" idx="2"/>
-          </p:cNvCxnSpPr>
-          <p:nvPr/>
-        </p:nvCxnSpPr>
-        <p:spPr>
-          <a:xfrm>
-            <a:off x="1840708" y="4860924"/>
-            <a:ext cx="0" cy="476546"/>
-          </a:xfrm>
-          <a:prstGeom prst="straightConnector1">
-            <a:avLst/>
-          </a:prstGeom>
-          <a:ln>
-            <a:tailEnd type="triangle"/>
-          </a:ln>
         </p:spPr>
         <p:style>
           <a:lnRef idx="1">
@@ -4449,15 +4372,16 @@
             </a:extLst>
           </p:cNvPr>
           <p:cNvCxnSpPr>
+            <a:cxnSpLocks/>
             <a:stCxn id="33" idx="2"/>
-            <a:endCxn id="60" idx="0"/>
+            <a:endCxn id="57" idx="0"/>
           </p:cNvCxnSpPr>
           <p:nvPr/>
         </p:nvCxnSpPr>
         <p:spPr>
-          <a:xfrm flipH="1">
-            <a:off x="1840708" y="3698875"/>
-            <a:ext cx="2381" cy="656279"/>
+          <a:xfrm>
+            <a:off x="1843089" y="4344287"/>
+            <a:ext cx="792" cy="551029"/>
           </a:xfrm>
           <a:prstGeom prst="straightConnector1">
             <a:avLst/>
@@ -4490,13 +4414,16 @@
               </a:ext>
             </a:extLst>
           </p:cNvPr>
-          <p:cNvCxnSpPr/>
+          <p:cNvCxnSpPr>
+            <a:cxnSpLocks/>
+            <a:stCxn id="90" idx="2"/>
+          </p:cNvCxnSpPr>
           <p:nvPr/>
         </p:nvCxnSpPr>
         <p:spPr>
-          <a:xfrm>
-            <a:off x="1837899" y="6061370"/>
-            <a:ext cx="0" cy="476546"/>
+          <a:xfrm flipH="1">
+            <a:off x="1821180" y="7798373"/>
+            <a:ext cx="26402" cy="438847"/>
           </a:xfrm>
           <a:prstGeom prst="straightConnector1">
             <a:avLst/>
@@ -4504,145 +4431,6 @@
           <a:ln>
             <a:tailEnd type="triangle"/>
           </a:ln>
-        </p:spPr>
-        <p:style>
-          <a:lnRef idx="1">
-            <a:schemeClr val="accent1"/>
-          </a:lnRef>
-          <a:fillRef idx="0">
-            <a:schemeClr val="accent1"/>
-          </a:fillRef>
-          <a:effectRef idx="0">
-            <a:schemeClr val="accent1"/>
-          </a:effectRef>
-          <a:fontRef idx="minor">
-            <a:schemeClr val="tx1"/>
-          </a:fontRef>
-        </p:style>
-      </p:cxnSp>
-      <p:sp>
-        <p:nvSpPr>
-          <p:cNvPr id="152" name="CaixaDeTexto 151">
-            <a:extLst>
-              <a:ext uri="{FF2B5EF4-FFF2-40B4-BE49-F238E27FC236}">
-                <a16:creationId xmlns:a16="http://schemas.microsoft.com/office/drawing/2014/main" id="{328E131A-2D7F-4226-9245-79E58D460280}"/>
-              </a:ext>
-            </a:extLst>
-          </p:cNvPr>
-          <p:cNvSpPr txBox="1"/>
-          <p:nvPr/>
-        </p:nvSpPr>
-        <p:spPr>
-          <a:xfrm>
-            <a:off x="1837899" y="6118363"/>
-            <a:ext cx="732631" cy="261610"/>
-          </a:xfrm>
-          <a:prstGeom prst="rect">
-            <a:avLst/>
-          </a:prstGeom>
-          <a:noFill/>
-        </p:spPr>
-        <p:txBody>
-          <a:bodyPr wrap="square" rtlCol="0">
-            <a:spAutoFit/>
-          </a:bodyPr>
-          <a:lstStyle/>
-          <a:p>
-            <a:r>
-              <a:rPr lang="pt-BR" sz="1100" b="1" dirty="0"/>
-              <a:t>Não</a:t>
-            </a:r>
-          </a:p>
-        </p:txBody>
-      </p:sp>
-      <p:sp>
-        <p:nvSpPr>
-          <p:cNvPr id="153" name="Retângulo 152">
-            <a:extLst>
-              <a:ext uri="{FF2B5EF4-FFF2-40B4-BE49-F238E27FC236}">
-                <a16:creationId xmlns:a16="http://schemas.microsoft.com/office/drawing/2014/main" id="{8F1FF129-271F-46FE-B20C-C6416A253612}"/>
-              </a:ext>
-            </a:extLst>
-          </p:cNvPr>
-          <p:cNvSpPr/>
-          <p:nvPr/>
-        </p:nvSpPr>
-        <p:spPr>
-          <a:xfrm>
-            <a:off x="2971798" y="3068441"/>
-            <a:ext cx="1476376" cy="505770"/>
-          </a:xfrm>
-          <a:prstGeom prst="rect">
-            <a:avLst/>
-          </a:prstGeom>
-          <a:solidFill>
-            <a:schemeClr val="accent1">
-              <a:lumMod val="40000"/>
-              <a:lumOff val="60000"/>
-            </a:schemeClr>
-          </a:solidFill>
-          <a:ln w="19050">
-            <a:solidFill>
-              <a:schemeClr val="accent1">
-                <a:lumMod val="75000"/>
-              </a:schemeClr>
-            </a:solidFill>
-          </a:ln>
-        </p:spPr>
-        <p:style>
-          <a:lnRef idx="2">
-            <a:schemeClr val="accent1">
-              <a:shade val="50000"/>
-            </a:schemeClr>
-          </a:lnRef>
-          <a:fillRef idx="1">
-            <a:schemeClr val="accent1"/>
-          </a:fillRef>
-          <a:effectRef idx="0">
-            <a:schemeClr val="accent1"/>
-          </a:effectRef>
-          <a:fontRef idx="minor">
-            <a:schemeClr val="lt1"/>
-          </a:fontRef>
-        </p:style>
-        <p:txBody>
-          <a:bodyPr rtlCol="0" anchor="ctr"/>
-          <a:lstStyle/>
-          <a:p>
-            <a:pPr algn="ctr"/>
-            <a:r>
-              <a:rPr lang="pt-BR" sz="900" dirty="0">
-                <a:solidFill>
-                  <a:schemeClr val="tx1"/>
-                </a:solidFill>
-              </a:rPr>
-              <a:t>Verificar cabeamento e atualizar página</a:t>
-            </a:r>
-          </a:p>
-        </p:txBody>
-      </p:sp>
-      <p:cxnSp>
-        <p:nvCxnSpPr>
-          <p:cNvPr id="163" name="Conector reto 162">
-            <a:extLst>
-              <a:ext uri="{FF2B5EF4-FFF2-40B4-BE49-F238E27FC236}">
-                <a16:creationId xmlns:a16="http://schemas.microsoft.com/office/drawing/2014/main" id="{2488AFC6-567C-498F-8DCC-1B0D87CC74EA}"/>
-              </a:ext>
-            </a:extLst>
-          </p:cNvPr>
-          <p:cNvCxnSpPr>
-            <a:cxnSpLocks/>
-          </p:cNvCxnSpPr>
-          <p:nvPr/>
-        </p:nvCxnSpPr>
-        <p:spPr>
-          <a:xfrm flipV="1">
-            <a:off x="2581277" y="3324540"/>
-            <a:ext cx="142872" cy="2860"/>
-          </a:xfrm>
-          <a:prstGeom prst="line">
-            <a:avLst/>
-          </a:prstGeom>
         </p:spPr>
         <p:style>
           <a:lnRef idx="1">
@@ -4670,14 +4458,15 @@
           </p:cNvPr>
           <p:cNvCxnSpPr>
             <a:cxnSpLocks/>
-            <a:endCxn id="153" idx="1"/>
+            <a:stCxn id="33" idx="3"/>
+            <a:endCxn id="71" idx="1"/>
           </p:cNvCxnSpPr>
           <p:nvPr/>
         </p:nvCxnSpPr>
         <p:spPr>
-          <a:xfrm>
-            <a:off x="2724149" y="3321326"/>
-            <a:ext cx="247649" cy="0"/>
+          <a:xfrm flipV="1">
+            <a:off x="2581277" y="3977859"/>
+            <a:ext cx="467119" cy="4478"/>
           </a:xfrm>
           <a:prstGeom prst="straightConnector1">
             <a:avLst/>
@@ -4715,7 +4504,7 @@
         </p:nvSpPr>
         <p:spPr>
           <a:xfrm>
-            <a:off x="2527392" y="3085711"/>
+            <a:off x="2527391" y="3701009"/>
             <a:ext cx="732631" cy="261610"/>
           </a:xfrm>
           <a:prstGeom prst="rect">
@@ -4747,14 +4536,13 @@
           </p:cNvPr>
           <p:cNvCxnSpPr>
             <a:cxnSpLocks/>
-            <a:stCxn id="153" idx="3"/>
           </p:cNvCxnSpPr>
           <p:nvPr/>
         </p:nvCxnSpPr>
         <p:spPr>
           <a:xfrm>
-            <a:off x="4448174" y="3321326"/>
-            <a:ext cx="551655" cy="0"/>
+            <a:off x="4400548" y="3966738"/>
+            <a:ext cx="599281" cy="0"/>
           </a:xfrm>
           <a:prstGeom prst="straightConnector1">
             <a:avLst/>
@@ -4793,9 +4581,9 @@
           <p:nvPr/>
         </p:nvCxnSpPr>
         <p:spPr>
-          <a:xfrm flipH="1" flipV="1">
-            <a:off x="5738017" y="1593852"/>
-            <a:ext cx="1" cy="1378263"/>
+          <a:xfrm flipV="1">
+            <a:off x="5722182" y="1523262"/>
+            <a:ext cx="5089" cy="2085708"/>
           </a:xfrm>
           <a:prstGeom prst="line">
             <a:avLst/>
@@ -4832,7 +4620,7 @@
         </p:nvCxnSpPr>
         <p:spPr>
           <a:xfrm flipH="1">
-            <a:off x="2724149" y="1593852"/>
+            <a:off x="2724149" y="1523263"/>
             <a:ext cx="3013868" cy="0"/>
           </a:xfrm>
           <a:prstGeom prst="straightConnector1">
@@ -4871,7 +4659,7 @@
         </p:nvSpPr>
         <p:spPr>
           <a:xfrm>
-            <a:off x="5722906" y="2737017"/>
+            <a:off x="5722906" y="3306062"/>
             <a:ext cx="732631" cy="261610"/>
           </a:xfrm>
           <a:prstGeom prst="rect">
@@ -4892,44 +4680,6 @@
           </a:p>
         </p:txBody>
       </p:sp>
-      <p:cxnSp>
-        <p:nvCxnSpPr>
-          <p:cNvPr id="7" name="Conector reto 6">
-            <a:extLst>
-              <a:ext uri="{FF2B5EF4-FFF2-40B4-BE49-F238E27FC236}">
-                <a16:creationId xmlns:a16="http://schemas.microsoft.com/office/drawing/2014/main" id="{1E43AC47-B719-4028-88B4-DCFE19BE2006}"/>
-              </a:ext>
-            </a:extLst>
-          </p:cNvPr>
-          <p:cNvCxnSpPr>
-            <a:stCxn id="71" idx="3"/>
-          </p:cNvCxnSpPr>
-          <p:nvPr/>
-        </p:nvCxnSpPr>
-        <p:spPr>
-          <a:xfrm flipV="1">
-            <a:off x="4400548" y="5693096"/>
-            <a:ext cx="1337469" cy="8256"/>
-          </a:xfrm>
-          <a:prstGeom prst="line">
-            <a:avLst/>
-          </a:prstGeom>
-        </p:spPr>
-        <p:style>
-          <a:lnRef idx="1">
-            <a:schemeClr val="accent1"/>
-          </a:lnRef>
-          <a:fillRef idx="0">
-            <a:schemeClr val="accent1"/>
-          </a:fillRef>
-          <a:effectRef idx="0">
-            <a:schemeClr val="accent1"/>
-          </a:effectRef>
-          <a:fontRef idx="minor">
-            <a:schemeClr val="tx1"/>
-          </a:fontRef>
-        </p:style>
-      </p:cxnSp>
       <p:cxnSp>
         <p:nvCxnSpPr>
           <p:cNvPr id="9" name="Conector de Seta Reta 8">
@@ -4946,9 +4696,9 @@
           <p:nvPr/>
         </p:nvCxnSpPr>
         <p:spPr>
-          <a:xfrm flipV="1">
-            <a:off x="5738017" y="3696015"/>
-            <a:ext cx="1" cy="2005320"/>
+          <a:xfrm flipH="1" flipV="1">
+            <a:off x="5722906" y="4324569"/>
+            <a:ext cx="20666" cy="4178697"/>
           </a:xfrm>
           <a:prstGeom prst="straightConnector1">
             <a:avLst/>
@@ -4986,7 +4736,7 @@
         </p:nvSpPr>
         <p:spPr>
           <a:xfrm>
-            <a:off x="1105692" y="6539489"/>
+            <a:off x="1105692" y="4895316"/>
             <a:ext cx="1476377" cy="723900"/>
           </a:xfrm>
           <a:prstGeom prst="flowChartDecision">
@@ -5033,7 +4783,7 @@
                   <a:schemeClr val="tx1"/>
                 </a:solidFill>
               </a:rPr>
-              <a:t>Problemas no cadastro?</a:t>
+              <a:t>Sensor está enviando dados?</a:t>
             </a:r>
           </a:p>
         </p:txBody>
@@ -5055,7 +4805,7 @@
         </p:nvCxnSpPr>
         <p:spPr>
           <a:xfrm>
-            <a:off x="2581277" y="6901422"/>
+            <a:off x="2581277" y="5247639"/>
             <a:ext cx="476247" cy="17"/>
           </a:xfrm>
           <a:prstGeom prst="straightConnector1">
@@ -5094,7 +4844,7 @@
         </p:nvSpPr>
         <p:spPr>
           <a:xfrm>
-            <a:off x="2527391" y="6631573"/>
+            <a:off x="2527391" y="4982630"/>
             <a:ext cx="732631" cy="261610"/>
           </a:xfrm>
           <a:prstGeom prst="rect">
@@ -5110,7 +4860,7 @@
           <a:p>
             <a:r>
               <a:rPr lang="pt-BR" sz="1100" b="1" dirty="0"/>
-              <a:t>Sim</a:t>
+              <a:t>Não</a:t>
             </a:r>
           </a:p>
         </p:txBody>
@@ -5129,7 +4879,7 @@
         </p:nvSpPr>
         <p:spPr>
           <a:xfrm>
-            <a:off x="3057524" y="6539489"/>
+            <a:off x="3057524" y="4885706"/>
             <a:ext cx="1343024" cy="723900"/>
           </a:xfrm>
           <a:prstGeom prst="flowChartPredefinedProcess">
@@ -5171,31 +4921,138 @@
                   <a:schemeClr val="tx1"/>
                 </a:solidFill>
               </a:rPr>
-              <a:t>Atualizar dados</a:t>
-            </a:r>
-          </a:p>
-        </p:txBody>
-      </p:sp>
-      <p:cxnSp>
-        <p:nvCxnSpPr>
-          <p:cNvPr id="72" name="Conector reto 71">
+              <a:t>Reiniciar aplicação</a:t>
+            </a:r>
+          </a:p>
+        </p:txBody>
+      </p:sp>
+      <p:sp>
+        <p:nvSpPr>
+          <p:cNvPr id="80" name="CaixaDeTexto 79">
             <a:extLst>
               <a:ext uri="{FF2B5EF4-FFF2-40B4-BE49-F238E27FC236}">
-                <a16:creationId xmlns:a16="http://schemas.microsoft.com/office/drawing/2014/main" id="{3EE57CFE-327E-45E5-8F82-A63DCF5F8F6E}"/>
+                <a16:creationId xmlns:a16="http://schemas.microsoft.com/office/drawing/2014/main" id="{24CA7EF3-27EC-4C76-AFD6-3569CC23B2D3}"/>
               </a:ext>
             </a:extLst>
           </p:cNvPr>
-          <p:cNvCxnSpPr/>
+          <p:cNvSpPr txBox="1"/>
+          <p:nvPr/>
+        </p:nvSpPr>
+        <p:spPr>
+          <a:xfrm>
+            <a:off x="1837899" y="5606189"/>
+            <a:ext cx="732631" cy="261610"/>
+          </a:xfrm>
+          <a:prstGeom prst="rect">
+            <a:avLst/>
+          </a:prstGeom>
+          <a:noFill/>
+        </p:spPr>
+        <p:txBody>
+          <a:bodyPr wrap="square" rtlCol="0">
+            <a:spAutoFit/>
+          </a:bodyPr>
+          <a:lstStyle/>
+          <a:p>
+            <a:r>
+              <a:rPr lang="pt-BR" sz="1100" b="1" dirty="0"/>
+              <a:t>Sim</a:t>
+            </a:r>
+          </a:p>
+        </p:txBody>
+      </p:sp>
+      <p:sp>
+        <p:nvSpPr>
+          <p:cNvPr id="68" name="Retângulo 67">
+            <a:extLst>
+              <a:ext uri="{FF2B5EF4-FFF2-40B4-BE49-F238E27FC236}">
+                <a16:creationId xmlns:a16="http://schemas.microsoft.com/office/drawing/2014/main" id="{5BB895FB-0C1C-4EB4-9294-4A3595CD059B}"/>
+              </a:ext>
+            </a:extLst>
+          </p:cNvPr>
+          <p:cNvSpPr/>
+          <p:nvPr/>
+        </p:nvSpPr>
+        <p:spPr>
+          <a:xfrm>
+            <a:off x="1096686" y="2001435"/>
+            <a:ext cx="1476376" cy="505770"/>
+          </a:xfrm>
+          <a:prstGeom prst="rect">
+            <a:avLst/>
+          </a:prstGeom>
+          <a:solidFill>
+            <a:schemeClr val="accent1">
+              <a:lumMod val="40000"/>
+              <a:lumOff val="60000"/>
+            </a:schemeClr>
+          </a:solidFill>
+          <a:ln w="19050">
+            <a:solidFill>
+              <a:schemeClr val="accent1">
+                <a:lumMod val="75000"/>
+              </a:schemeClr>
+            </a:solidFill>
+          </a:ln>
+        </p:spPr>
+        <p:style>
+          <a:lnRef idx="2">
+            <a:schemeClr val="accent1">
+              <a:shade val="50000"/>
+            </a:schemeClr>
+          </a:lnRef>
+          <a:fillRef idx="1">
+            <a:schemeClr val="accent1"/>
+          </a:fillRef>
+          <a:effectRef idx="0">
+            <a:schemeClr val="accent1"/>
+          </a:effectRef>
+          <a:fontRef idx="minor">
+            <a:schemeClr val="lt1"/>
+          </a:fontRef>
+        </p:style>
+        <p:txBody>
+          <a:bodyPr rtlCol="0" anchor="ctr"/>
+          <a:lstStyle/>
+          <a:p>
+            <a:pPr algn="ctr"/>
+            <a:r>
+              <a:rPr lang="pt-BR" sz="900" dirty="0">
+                <a:solidFill>
+                  <a:schemeClr val="tx1"/>
+                </a:solidFill>
+              </a:rPr>
+              <a:t>Registro e Documentação</a:t>
+            </a:r>
+          </a:p>
+        </p:txBody>
+      </p:sp>
+      <p:cxnSp>
+        <p:nvCxnSpPr>
+          <p:cNvPr id="75" name="Conector de Seta Reta 74">
+            <a:extLst>
+              <a:ext uri="{FF2B5EF4-FFF2-40B4-BE49-F238E27FC236}">
+                <a16:creationId xmlns:a16="http://schemas.microsoft.com/office/drawing/2014/main" id="{C7AABE9A-6B1D-4479-A9CC-0171F497E505}"/>
+              </a:ext>
+            </a:extLst>
+          </p:cNvPr>
+          <p:cNvCxnSpPr>
+            <a:cxnSpLocks/>
+            <a:stCxn id="68" idx="2"/>
+          </p:cNvCxnSpPr>
           <p:nvPr/>
         </p:nvCxnSpPr>
         <p:spPr>
-          <a:xfrm flipV="1">
-            <a:off x="4400548" y="6901422"/>
-            <a:ext cx="1337469" cy="8256"/>
-          </a:xfrm>
-          <a:prstGeom prst="line">
+          <a:xfrm>
+            <a:off x="1834874" y="2507205"/>
+            <a:ext cx="1" cy="187625"/>
+          </a:xfrm>
+          <a:prstGeom prst="straightConnector1">
             <a:avLst/>
           </a:prstGeom>
+          <a:ln>
+            <a:tailEnd type="triangle"/>
+          </a:ln>
         </p:spPr>
         <p:style>
           <a:lnRef idx="1">
@@ -5214,10 +5071,10 @@
       </p:cxnSp>
       <p:cxnSp>
         <p:nvCxnSpPr>
-          <p:cNvPr id="73" name="Conector reto 72">
+          <p:cNvPr id="82" name="Conector de Seta Reta 81">
             <a:extLst>
               <a:ext uri="{FF2B5EF4-FFF2-40B4-BE49-F238E27FC236}">
-                <a16:creationId xmlns:a16="http://schemas.microsoft.com/office/drawing/2014/main" id="{E6276163-86A4-4909-90D9-A264F4B8172C}"/>
+                <a16:creationId xmlns:a16="http://schemas.microsoft.com/office/drawing/2014/main" id="{B06E8CE1-8F6A-402C-9908-967406F9E774}"/>
               </a:ext>
             </a:extLst>
           </p:cNvPr>
@@ -5228,12 +5085,15 @@
         </p:nvCxnSpPr>
         <p:spPr>
           <a:xfrm>
-            <a:off x="5731746" y="5570908"/>
-            <a:ext cx="11828" cy="2538842"/>
-          </a:xfrm>
-          <a:prstGeom prst="line">
+            <a:off x="4400548" y="5257266"/>
+            <a:ext cx="1346200" cy="0"/>
+          </a:xfrm>
+          <a:prstGeom prst="straightConnector1">
             <a:avLst/>
           </a:prstGeom>
+          <a:ln>
+            <a:tailEnd type="triangle"/>
+          </a:ln>
         </p:spPr>
         <p:style>
           <a:lnRef idx="1">
@@ -5252,20 +5112,24 @@
       </p:cxnSp>
       <p:cxnSp>
         <p:nvCxnSpPr>
-          <p:cNvPr id="74" name="Conector de Seta Reta 73">
+          <p:cNvPr id="83" name="Conector de Seta Reta 82">
             <a:extLst>
               <a:ext uri="{FF2B5EF4-FFF2-40B4-BE49-F238E27FC236}">
-                <a16:creationId xmlns:a16="http://schemas.microsoft.com/office/drawing/2014/main" id="{DA8C4B2E-8790-4A81-AE21-C854B5FFB363}"/>
+                <a16:creationId xmlns:a16="http://schemas.microsoft.com/office/drawing/2014/main" id="{17A789DA-9252-46A0-BDE4-AA3B8DD3359D}"/>
               </a:ext>
             </a:extLst>
           </p:cNvPr>
-          <p:cNvCxnSpPr/>
+          <p:cNvCxnSpPr>
+            <a:cxnSpLocks/>
+            <a:stCxn id="81" idx="2"/>
+            <a:endCxn id="90" idx="0"/>
+          </p:cNvCxnSpPr>
           <p:nvPr/>
         </p:nvCxnSpPr>
         <p:spPr>
           <a:xfrm>
-            <a:off x="1837899" y="7266813"/>
-            <a:ext cx="0" cy="476546"/>
+            <a:off x="1843881" y="6573797"/>
+            <a:ext cx="3701" cy="500676"/>
           </a:xfrm>
           <a:prstGeom prst="straightConnector1">
             <a:avLst/>
@@ -5291,10 +5155,10 @@
       </p:cxnSp>
       <p:sp>
         <p:nvSpPr>
-          <p:cNvPr id="76" name="Fluxograma: Processo Predefinido 75">
+          <p:cNvPr id="90" name="Fluxograma: Decisão 89">
             <a:extLst>
               <a:ext uri="{FF2B5EF4-FFF2-40B4-BE49-F238E27FC236}">
-                <a16:creationId xmlns:a16="http://schemas.microsoft.com/office/drawing/2014/main" id="{56D6A018-A312-40C0-841D-76CDFAAC1AEF}"/>
+                <a16:creationId xmlns:a16="http://schemas.microsoft.com/office/drawing/2014/main" id="{D9F32F10-27D7-4A0B-A4B1-E68AD40DBEF1}"/>
               </a:ext>
             </a:extLst>
           </p:cNvPr>
@@ -5303,7 +5167,73 @@
         </p:nvSpPr>
         <p:spPr>
           <a:xfrm>
-            <a:off x="1166387" y="7753758"/>
+            <a:off x="1051082" y="7074473"/>
+            <a:ext cx="1592999" cy="723900"/>
+          </a:xfrm>
+          <a:prstGeom prst="flowChartDecision">
+            <a:avLst/>
+          </a:prstGeom>
+          <a:solidFill>
+            <a:schemeClr val="accent1">
+              <a:lumMod val="40000"/>
+              <a:lumOff val="60000"/>
+            </a:schemeClr>
+          </a:solidFill>
+          <a:ln w="19050">
+            <a:solidFill>
+              <a:schemeClr val="accent1">
+                <a:lumMod val="75000"/>
+              </a:schemeClr>
+            </a:solidFill>
+          </a:ln>
+        </p:spPr>
+        <p:style>
+          <a:lnRef idx="2">
+            <a:schemeClr val="accent1">
+              <a:shade val="50000"/>
+            </a:schemeClr>
+          </a:lnRef>
+          <a:fillRef idx="1">
+            <a:schemeClr val="accent1"/>
+          </a:fillRef>
+          <a:effectRef idx="0">
+            <a:schemeClr val="accent1"/>
+          </a:effectRef>
+          <a:fontRef idx="minor">
+            <a:schemeClr val="lt1"/>
+          </a:fontRef>
+        </p:style>
+        <p:txBody>
+          <a:bodyPr rtlCol="0" anchor="ctr"/>
+          <a:lstStyle/>
+          <a:p>
+            <a:pPr algn="ctr"/>
+            <a:r>
+              <a:rPr lang="pt-BR" sz="900" dirty="0">
+                <a:solidFill>
+                  <a:schemeClr val="tx1"/>
+                </a:solidFill>
+              </a:rPr>
+              <a:t>Periféricos danificados</a:t>
+            </a:r>
+          </a:p>
+        </p:txBody>
+      </p:sp>
+      <p:sp>
+        <p:nvSpPr>
+          <p:cNvPr id="92" name="Fluxograma: Processo Predefinido 91">
+            <a:extLst>
+              <a:ext uri="{FF2B5EF4-FFF2-40B4-BE49-F238E27FC236}">
+                <a16:creationId xmlns:a16="http://schemas.microsoft.com/office/drawing/2014/main" id="{A3F50D67-B81B-47B5-BCD5-2B7647E0487E}"/>
+              </a:ext>
+            </a:extLst>
+          </p:cNvPr>
+          <p:cNvSpPr/>
+          <p:nvPr/>
+        </p:nvSpPr>
+        <p:spPr>
+          <a:xfrm>
+            <a:off x="3023714" y="8145953"/>
             <a:ext cx="1343024" cy="723900"/>
           </a:xfrm>
           <a:prstGeom prst="flowChartPredefinedProcess">
@@ -5345,90 +5275,17 @@
                   <a:schemeClr val="tx1"/>
                 </a:solidFill>
               </a:rPr>
-              <a:t>Solicitar técnico no cliente</a:t>
-            </a:r>
-          </a:p>
-        </p:txBody>
-      </p:sp>
-      <p:sp>
-        <p:nvSpPr>
-          <p:cNvPr id="80" name="CaixaDeTexto 79">
+              <a:t>Trocar sensor e derivados</a:t>
+            </a:r>
+          </a:p>
+        </p:txBody>
+      </p:sp>
+      <p:sp>
+        <p:nvSpPr>
+          <p:cNvPr id="130" name="Retângulo 129">
             <a:extLst>
               <a:ext uri="{FF2B5EF4-FFF2-40B4-BE49-F238E27FC236}">
-                <a16:creationId xmlns:a16="http://schemas.microsoft.com/office/drawing/2014/main" id="{24CA7EF3-27EC-4C76-AFD6-3569CC23B2D3}"/>
-              </a:ext>
-            </a:extLst>
-          </p:cNvPr>
-          <p:cNvSpPr txBox="1"/>
-          <p:nvPr/>
-        </p:nvSpPr>
-        <p:spPr>
-          <a:xfrm>
-            <a:off x="1837899" y="7356945"/>
-            <a:ext cx="732631" cy="261610"/>
-          </a:xfrm>
-          <a:prstGeom prst="rect">
-            <a:avLst/>
-          </a:prstGeom>
-          <a:noFill/>
-        </p:spPr>
-        <p:txBody>
-          <a:bodyPr wrap="square" rtlCol="0">
-            <a:spAutoFit/>
-          </a:bodyPr>
-          <a:lstStyle/>
-          <a:p>
-            <a:r>
-              <a:rPr lang="pt-BR" sz="1100" b="1" dirty="0"/>
-              <a:t>Não</a:t>
-            </a:r>
-          </a:p>
-        </p:txBody>
-      </p:sp>
-      <p:cxnSp>
-        <p:nvCxnSpPr>
-          <p:cNvPr id="81" name="Conector reto 80">
-            <a:extLst>
-              <a:ext uri="{FF2B5EF4-FFF2-40B4-BE49-F238E27FC236}">
-                <a16:creationId xmlns:a16="http://schemas.microsoft.com/office/drawing/2014/main" id="{9EBD1979-A649-4129-BA70-9A7249FF3F91}"/>
-              </a:ext>
-            </a:extLst>
-          </p:cNvPr>
-          <p:cNvCxnSpPr>
-            <a:cxnSpLocks/>
-          </p:cNvCxnSpPr>
-          <p:nvPr/>
-        </p:nvCxnSpPr>
-        <p:spPr>
-          <a:xfrm flipV="1">
-            <a:off x="2483917" y="8101526"/>
-            <a:ext cx="3256085" cy="22438"/>
-          </a:xfrm>
-          <a:prstGeom prst="line">
-            <a:avLst/>
-          </a:prstGeom>
-        </p:spPr>
-        <p:style>
-          <a:lnRef idx="1">
-            <a:schemeClr val="accent1"/>
-          </a:lnRef>
-          <a:fillRef idx="0">
-            <a:schemeClr val="accent1"/>
-          </a:fillRef>
-          <a:effectRef idx="0">
-            <a:schemeClr val="accent1"/>
-          </a:effectRef>
-          <a:fontRef idx="minor">
-            <a:schemeClr val="tx1"/>
-          </a:fontRef>
-        </p:style>
-      </p:cxnSp>
-      <p:sp>
-        <p:nvSpPr>
-          <p:cNvPr id="19" name="Retângulo 18">
-            <a:extLst>
-              <a:ext uri="{FF2B5EF4-FFF2-40B4-BE49-F238E27FC236}">
-                <a16:creationId xmlns:a16="http://schemas.microsoft.com/office/drawing/2014/main" id="{EAECC83D-CB96-47F9-9631-C6B9E2C83F8C}"/>
+                <a16:creationId xmlns:a16="http://schemas.microsoft.com/office/drawing/2014/main" id="{695AD63B-456C-4FD5-B763-55BB6005A602}"/>
               </a:ext>
             </a:extLst>
           </p:cNvPr>
@@ -5471,10 +5328,497 @@
           </a:p>
         </p:txBody>
       </p:sp>
+      <p:sp>
+        <p:nvSpPr>
+          <p:cNvPr id="71" name="Fluxograma: Processo Predefinido 70">
+            <a:extLst>
+              <a:ext uri="{FF2B5EF4-FFF2-40B4-BE49-F238E27FC236}">
+                <a16:creationId xmlns:a16="http://schemas.microsoft.com/office/drawing/2014/main" id="{4D7346D6-A224-49DE-B5E7-B74245448F80}"/>
+              </a:ext>
+            </a:extLst>
+          </p:cNvPr>
+          <p:cNvSpPr/>
+          <p:nvPr/>
+        </p:nvSpPr>
+        <p:spPr>
+          <a:xfrm>
+            <a:off x="3048396" y="3615909"/>
+            <a:ext cx="1343024" cy="723900"/>
+          </a:xfrm>
+          <a:prstGeom prst="flowChartPredefinedProcess">
+            <a:avLst/>
+          </a:prstGeom>
+          <a:solidFill>
+            <a:srgbClr val="B4C7E7"/>
+          </a:solidFill>
+          <a:ln w="19050">
+            <a:solidFill>
+              <a:srgbClr val="2F5597"/>
+            </a:solidFill>
+          </a:ln>
+        </p:spPr>
+        <p:style>
+          <a:lnRef idx="2">
+            <a:schemeClr val="accent1">
+              <a:shade val="50000"/>
+            </a:schemeClr>
+          </a:lnRef>
+          <a:fillRef idx="1">
+            <a:schemeClr val="accent1"/>
+          </a:fillRef>
+          <a:effectRef idx="0">
+            <a:schemeClr val="accent1"/>
+          </a:effectRef>
+          <a:fontRef idx="minor">
+            <a:schemeClr val="lt1"/>
+          </a:fontRef>
+        </p:style>
+        <p:txBody>
+          <a:bodyPr rtlCol="0" anchor="ctr"/>
+          <a:lstStyle/>
+          <a:p>
+            <a:pPr algn="ctr"/>
+            <a:r>
+              <a:rPr lang="pt-BR" sz="900" dirty="0">
+                <a:solidFill>
+                  <a:schemeClr val="tx1"/>
+                </a:solidFill>
+              </a:rPr>
+              <a:t>Atualizar dados</a:t>
+            </a:r>
+          </a:p>
+        </p:txBody>
+      </p:sp>
+      <p:sp>
+        <p:nvSpPr>
+          <p:cNvPr id="73" name="Fluxograma: Processo Predefinido 72">
+            <a:extLst>
+              <a:ext uri="{FF2B5EF4-FFF2-40B4-BE49-F238E27FC236}">
+                <a16:creationId xmlns:a16="http://schemas.microsoft.com/office/drawing/2014/main" id="{76D44E85-BF67-4C2D-9656-F775D21B107D}"/>
+              </a:ext>
+            </a:extLst>
+          </p:cNvPr>
+          <p:cNvSpPr/>
+          <p:nvPr/>
+        </p:nvSpPr>
+        <p:spPr>
+          <a:xfrm>
+            <a:off x="3057524" y="5858857"/>
+            <a:ext cx="1343024" cy="723900"/>
+          </a:xfrm>
+          <a:prstGeom prst="flowChartPredefinedProcess">
+            <a:avLst/>
+          </a:prstGeom>
+          <a:solidFill>
+            <a:srgbClr val="B4C7E7"/>
+          </a:solidFill>
+          <a:ln w="19050">
+            <a:solidFill>
+              <a:srgbClr val="2F5597"/>
+            </a:solidFill>
+          </a:ln>
+        </p:spPr>
+        <p:style>
+          <a:lnRef idx="2">
+            <a:schemeClr val="accent1">
+              <a:shade val="50000"/>
+            </a:schemeClr>
+          </a:lnRef>
+          <a:fillRef idx="1">
+            <a:schemeClr val="accent1"/>
+          </a:fillRef>
+          <a:effectRef idx="0">
+            <a:schemeClr val="accent1"/>
+          </a:effectRef>
+          <a:fontRef idx="minor">
+            <a:schemeClr val="lt1"/>
+          </a:fontRef>
+        </p:style>
+        <p:txBody>
+          <a:bodyPr rtlCol="0" anchor="ctr"/>
+          <a:lstStyle/>
+          <a:p>
+            <a:pPr algn="ctr"/>
+            <a:r>
+              <a:rPr lang="pt-BR" sz="900" dirty="0">
+                <a:solidFill>
+                  <a:schemeClr val="tx1"/>
+                </a:solidFill>
+              </a:rPr>
+              <a:t>Atualizar a aplicação</a:t>
+            </a:r>
+          </a:p>
+        </p:txBody>
+      </p:sp>
+      <p:cxnSp>
+        <p:nvCxnSpPr>
+          <p:cNvPr id="12" name="Conector de Seta Reta 11">
+            <a:extLst>
+              <a:ext uri="{FF2B5EF4-FFF2-40B4-BE49-F238E27FC236}">
+                <a16:creationId xmlns:a16="http://schemas.microsoft.com/office/drawing/2014/main" id="{596A6938-CD63-4158-9A7B-A948E790CABB}"/>
+              </a:ext>
+            </a:extLst>
+          </p:cNvPr>
+          <p:cNvCxnSpPr>
+            <a:stCxn id="73" idx="0"/>
+            <a:endCxn id="66" idx="2"/>
+          </p:cNvCxnSpPr>
+          <p:nvPr/>
+        </p:nvCxnSpPr>
+        <p:spPr>
+          <a:xfrm flipV="1">
+            <a:off x="3729036" y="5609606"/>
+            <a:ext cx="0" cy="249251"/>
+          </a:xfrm>
+          <a:prstGeom prst="straightConnector1">
+            <a:avLst/>
+          </a:prstGeom>
+          <a:ln>
+            <a:tailEnd type="triangle"/>
+          </a:ln>
+        </p:spPr>
+        <p:style>
+          <a:lnRef idx="1">
+            <a:schemeClr val="accent1"/>
+          </a:lnRef>
+          <a:fillRef idx="0">
+            <a:schemeClr val="accent1"/>
+          </a:fillRef>
+          <a:effectRef idx="0">
+            <a:schemeClr val="accent1"/>
+          </a:effectRef>
+          <a:fontRef idx="minor">
+            <a:schemeClr val="tx1"/>
+          </a:fontRef>
+        </p:style>
+      </p:cxnSp>
+      <p:sp>
+        <p:nvSpPr>
+          <p:cNvPr id="81" name="Fluxograma: Decisão 80">
+            <a:extLst>
+              <a:ext uri="{FF2B5EF4-FFF2-40B4-BE49-F238E27FC236}">
+                <a16:creationId xmlns:a16="http://schemas.microsoft.com/office/drawing/2014/main" id="{23688BEE-37DF-415B-8D3E-C4AE3B2F785F}"/>
+              </a:ext>
+            </a:extLst>
+          </p:cNvPr>
+          <p:cNvSpPr/>
+          <p:nvPr/>
+        </p:nvSpPr>
+        <p:spPr>
+          <a:xfrm>
+            <a:off x="1105692" y="5849897"/>
+            <a:ext cx="1476377" cy="723900"/>
+          </a:xfrm>
+          <a:prstGeom prst="flowChartDecision">
+            <a:avLst/>
+          </a:prstGeom>
+          <a:solidFill>
+            <a:schemeClr val="accent1">
+              <a:lumMod val="40000"/>
+              <a:lumOff val="60000"/>
+            </a:schemeClr>
+          </a:solidFill>
+          <a:ln w="19050">
+            <a:solidFill>
+              <a:schemeClr val="accent1">
+                <a:lumMod val="75000"/>
+              </a:schemeClr>
+            </a:solidFill>
+          </a:ln>
+        </p:spPr>
+        <p:style>
+          <a:lnRef idx="2">
+            <a:schemeClr val="accent1">
+              <a:shade val="50000"/>
+            </a:schemeClr>
+          </a:lnRef>
+          <a:fillRef idx="1">
+            <a:schemeClr val="accent1"/>
+          </a:fillRef>
+          <a:effectRef idx="0">
+            <a:schemeClr val="accent1"/>
+          </a:effectRef>
+          <a:fontRef idx="minor">
+            <a:schemeClr val="lt1"/>
+          </a:fontRef>
+        </p:style>
+        <p:txBody>
+          <a:bodyPr rtlCol="0" anchor="ctr"/>
+          <a:lstStyle/>
+          <a:p>
+            <a:pPr algn="ctr"/>
+            <a:r>
+              <a:rPr lang="pt-BR" sz="900" dirty="0">
+                <a:solidFill>
+                  <a:schemeClr val="tx1"/>
+                </a:solidFill>
+              </a:rPr>
+              <a:t>Sensor está recebendo dados?</a:t>
+            </a:r>
+          </a:p>
+        </p:txBody>
+      </p:sp>
+      <p:cxnSp>
+        <p:nvCxnSpPr>
+          <p:cNvPr id="84" name="Conector de Seta Reta 83">
+            <a:extLst>
+              <a:ext uri="{FF2B5EF4-FFF2-40B4-BE49-F238E27FC236}">
+                <a16:creationId xmlns:a16="http://schemas.microsoft.com/office/drawing/2014/main" id="{64374F5D-A9E1-41B3-AF81-A30F02BC4C26}"/>
+              </a:ext>
+            </a:extLst>
+          </p:cNvPr>
+          <p:cNvCxnSpPr>
+            <a:cxnSpLocks/>
+            <a:endCxn id="81" idx="0"/>
+          </p:cNvCxnSpPr>
+          <p:nvPr/>
+        </p:nvCxnSpPr>
+        <p:spPr>
+          <a:xfrm>
+            <a:off x="1843881" y="5608013"/>
+            <a:ext cx="0" cy="241884"/>
+          </a:xfrm>
+          <a:prstGeom prst="straightConnector1">
+            <a:avLst/>
+          </a:prstGeom>
+          <a:ln>
+            <a:tailEnd type="triangle"/>
+          </a:ln>
+        </p:spPr>
+        <p:style>
+          <a:lnRef idx="1">
+            <a:schemeClr val="accent1"/>
+          </a:lnRef>
+          <a:fillRef idx="0">
+            <a:schemeClr val="accent1"/>
+          </a:fillRef>
+          <a:effectRef idx="0">
+            <a:schemeClr val="accent1"/>
+          </a:effectRef>
+          <a:fontRef idx="minor">
+            <a:schemeClr val="tx1"/>
+          </a:fontRef>
+        </p:style>
+      </p:cxnSp>
+      <p:cxnSp>
+        <p:nvCxnSpPr>
+          <p:cNvPr id="85" name="Conector de Seta Reta 84">
+            <a:extLst>
+              <a:ext uri="{FF2B5EF4-FFF2-40B4-BE49-F238E27FC236}">
+                <a16:creationId xmlns:a16="http://schemas.microsoft.com/office/drawing/2014/main" id="{524C41D2-9EBF-4A95-BD6C-E02119423C6E}"/>
+              </a:ext>
+            </a:extLst>
+          </p:cNvPr>
+          <p:cNvCxnSpPr>
+            <a:cxnSpLocks/>
+          </p:cNvCxnSpPr>
+          <p:nvPr/>
+        </p:nvCxnSpPr>
+        <p:spPr>
+          <a:xfrm>
+            <a:off x="2581277" y="6211830"/>
+            <a:ext cx="476247" cy="17"/>
+          </a:xfrm>
+          <a:prstGeom prst="straightConnector1">
+            <a:avLst/>
+          </a:prstGeom>
+          <a:ln>
+            <a:tailEnd type="triangle"/>
+          </a:ln>
+        </p:spPr>
+        <p:style>
+          <a:lnRef idx="1">
+            <a:schemeClr val="accent1"/>
+          </a:lnRef>
+          <a:fillRef idx="0">
+            <a:schemeClr val="accent1"/>
+          </a:fillRef>
+          <a:effectRef idx="0">
+            <a:schemeClr val="accent1"/>
+          </a:effectRef>
+          <a:fontRef idx="minor">
+            <a:schemeClr val="tx1"/>
+          </a:fontRef>
+        </p:style>
+      </p:cxnSp>
+      <p:sp>
+        <p:nvSpPr>
+          <p:cNvPr id="86" name="CaixaDeTexto 85">
+            <a:extLst>
+              <a:ext uri="{FF2B5EF4-FFF2-40B4-BE49-F238E27FC236}">
+                <a16:creationId xmlns:a16="http://schemas.microsoft.com/office/drawing/2014/main" id="{6E3E5447-F2F7-474F-8EAD-75C5FDCBF73D}"/>
+              </a:ext>
+            </a:extLst>
+          </p:cNvPr>
+          <p:cNvSpPr txBox="1"/>
+          <p:nvPr/>
+        </p:nvSpPr>
+        <p:spPr>
+          <a:xfrm>
+            <a:off x="2527391" y="5967675"/>
+            <a:ext cx="732631" cy="261610"/>
+          </a:xfrm>
+          <a:prstGeom prst="rect">
+            <a:avLst/>
+          </a:prstGeom>
+          <a:noFill/>
+        </p:spPr>
+        <p:txBody>
+          <a:bodyPr wrap="square" rtlCol="0">
+            <a:spAutoFit/>
+          </a:bodyPr>
+          <a:lstStyle/>
+          <a:p>
+            <a:r>
+              <a:rPr lang="pt-BR" sz="1100" b="1" dirty="0"/>
+              <a:t>Não</a:t>
+            </a:r>
+          </a:p>
+        </p:txBody>
+      </p:sp>
+      <p:sp>
+        <p:nvSpPr>
+          <p:cNvPr id="87" name="CaixaDeTexto 86">
+            <a:extLst>
+              <a:ext uri="{FF2B5EF4-FFF2-40B4-BE49-F238E27FC236}">
+                <a16:creationId xmlns:a16="http://schemas.microsoft.com/office/drawing/2014/main" id="{B68DB1AD-5764-45C4-B5AE-3F1329DF364F}"/>
+              </a:ext>
+            </a:extLst>
+          </p:cNvPr>
+          <p:cNvSpPr txBox="1"/>
+          <p:nvPr/>
+        </p:nvSpPr>
+        <p:spPr>
+          <a:xfrm>
+            <a:off x="1837899" y="6591234"/>
+            <a:ext cx="732631" cy="261610"/>
+          </a:xfrm>
+          <a:prstGeom prst="rect">
+            <a:avLst/>
+          </a:prstGeom>
+          <a:noFill/>
+        </p:spPr>
+        <p:txBody>
+          <a:bodyPr wrap="square" rtlCol="0">
+            <a:spAutoFit/>
+          </a:bodyPr>
+          <a:lstStyle/>
+          <a:p>
+            <a:r>
+              <a:rPr lang="pt-BR" sz="1100" b="1" dirty="0"/>
+              <a:t>Sim</a:t>
+            </a:r>
+          </a:p>
+        </p:txBody>
+      </p:sp>
+      <p:sp>
+        <p:nvSpPr>
+          <p:cNvPr id="89" name="Retângulo 88">
+            <a:extLst>
+              <a:ext uri="{FF2B5EF4-FFF2-40B4-BE49-F238E27FC236}">
+                <a16:creationId xmlns:a16="http://schemas.microsoft.com/office/drawing/2014/main" id="{522AD900-D3B8-406E-8C5C-757E4A7E0534}"/>
+              </a:ext>
+            </a:extLst>
+          </p:cNvPr>
+          <p:cNvSpPr/>
+          <p:nvPr/>
+        </p:nvSpPr>
+        <p:spPr>
+          <a:xfrm>
+            <a:off x="1109394" y="8260934"/>
+            <a:ext cx="1476376" cy="505770"/>
+          </a:xfrm>
+          <a:prstGeom prst="rect">
+            <a:avLst/>
+          </a:prstGeom>
+          <a:solidFill>
+            <a:schemeClr val="accent1">
+              <a:lumMod val="40000"/>
+              <a:lumOff val="60000"/>
+            </a:schemeClr>
+          </a:solidFill>
+          <a:ln w="19050">
+            <a:solidFill>
+              <a:schemeClr val="accent1">
+                <a:lumMod val="75000"/>
+              </a:schemeClr>
+            </a:solidFill>
+          </a:ln>
+        </p:spPr>
+        <p:style>
+          <a:lnRef idx="2">
+            <a:schemeClr val="accent1">
+              <a:shade val="50000"/>
+            </a:schemeClr>
+          </a:lnRef>
+          <a:fillRef idx="1">
+            <a:schemeClr val="accent1"/>
+          </a:fillRef>
+          <a:effectRef idx="0">
+            <a:schemeClr val="accent1"/>
+          </a:effectRef>
+          <a:fontRef idx="minor">
+            <a:schemeClr val="lt1"/>
+          </a:fontRef>
+        </p:style>
+        <p:txBody>
+          <a:bodyPr rtlCol="0" anchor="ctr"/>
+          <a:lstStyle/>
+          <a:p>
+            <a:pPr algn="ctr"/>
+            <a:r>
+              <a:rPr lang="pt-BR" sz="900" dirty="0">
+                <a:solidFill>
+                  <a:schemeClr val="tx1"/>
+                </a:solidFill>
+              </a:rPr>
+              <a:t>Técnico no Cliente</a:t>
+            </a:r>
+          </a:p>
+        </p:txBody>
+      </p:sp>
+      <p:cxnSp>
+        <p:nvCxnSpPr>
+          <p:cNvPr id="30" name="Conector reto 29">
+            <a:extLst>
+              <a:ext uri="{FF2B5EF4-FFF2-40B4-BE49-F238E27FC236}">
+                <a16:creationId xmlns:a16="http://schemas.microsoft.com/office/drawing/2014/main" id="{368E01C5-C9A3-4D3E-91A6-9A88CDA6CFA0}"/>
+              </a:ext>
+            </a:extLst>
+          </p:cNvPr>
+          <p:cNvCxnSpPr>
+            <a:stCxn id="92" idx="3"/>
+          </p:cNvCxnSpPr>
+          <p:nvPr/>
+        </p:nvCxnSpPr>
+        <p:spPr>
+          <a:xfrm flipV="1">
+            <a:off x="4366738" y="8503266"/>
+            <a:ext cx="1380010" cy="4637"/>
+          </a:xfrm>
+          <a:prstGeom prst="line">
+            <a:avLst/>
+          </a:prstGeom>
+        </p:spPr>
+        <p:style>
+          <a:lnRef idx="1">
+            <a:schemeClr val="accent1"/>
+          </a:lnRef>
+          <a:fillRef idx="0">
+            <a:schemeClr val="accent1"/>
+          </a:fillRef>
+          <a:effectRef idx="0">
+            <a:schemeClr val="accent1"/>
+          </a:effectRef>
+          <a:fontRef idx="minor">
+            <a:schemeClr val="tx1"/>
+          </a:fontRef>
+        </p:style>
+      </p:cxnSp>
     </p:spTree>
     <p:extLst>
       <p:ext uri="{BB962C8B-B14F-4D97-AF65-F5344CB8AC3E}">
-        <p14:creationId xmlns:p14="http://schemas.microsoft.com/office/powerpoint/2010/main" val="117826146"/>
+        <p14:creationId xmlns:p14="http://schemas.microsoft.com/office/powerpoint/2010/main" val="1983195181"/>
       </p:ext>
     </p:extLst>
   </p:cSld>

</xml_diff>

<commit_message>
Atualizações no HLD e LLD
</commit_message>
<xml_diff>
--- a/Agro Cane/Tecnologia da Informação/Fluxograma/Fluxograma.pptx
+++ b/Agro Cane/Tecnologia da Informação/Fluxograma/Fluxograma.pptx
@@ -5,7 +5,7 @@
     <p:sldMasterId id="2147483744" r:id="rId1"/>
   </p:sldMasterIdLst>
   <p:sldIdLst>
-    <p:sldId id="258" r:id="rId2"/>
+    <p:sldId id="262" r:id="rId2"/>
   </p:sldIdLst>
   <p:sldSz cx="8999538" cy="9720263"/>
   <p:notesSz cx="6858000" cy="9144000"/>
@@ -104,6 +104,11 @@
       </a:defRPr>
     </a:lvl9pPr>
   </p:defaultTextStyle>
+  <p:extLst>
+    <p:ext uri="{EFAFB233-063F-42B5-8137-9DF3F51BA10A}">
+      <p15:sldGuideLst xmlns:p15="http://schemas.microsoft.com/office/powerpoint/2012/main"/>
+    </p:ext>
+  </p:extLst>
 </p:presentation>
 </file>
 
@@ -238,7 +243,7 @@
           <a:p>
             <a:fld id="{A6BC64F7-5FB0-4183-AA12-A26509D9C920}" type="datetimeFigureOut">
               <a:rPr lang="pt-BR" smtClean="0"/>
-              <a:t>11/05/2021</a:t>
+              <a:t>18/05/2021</a:t>
             </a:fld>
             <a:endParaRPr lang="pt-BR"/>
           </a:p>
@@ -408,7 +413,7 @@
           <a:p>
             <a:fld id="{A6BC64F7-5FB0-4183-AA12-A26509D9C920}" type="datetimeFigureOut">
               <a:rPr lang="pt-BR" smtClean="0"/>
-              <a:t>11/05/2021</a:t>
+              <a:t>18/05/2021</a:t>
             </a:fld>
             <a:endParaRPr lang="pt-BR"/>
           </a:p>
@@ -588,7 +593,7 @@
           <a:p>
             <a:fld id="{A6BC64F7-5FB0-4183-AA12-A26509D9C920}" type="datetimeFigureOut">
               <a:rPr lang="pt-BR" smtClean="0"/>
-              <a:t>11/05/2021</a:t>
+              <a:t>18/05/2021</a:t>
             </a:fld>
             <a:endParaRPr lang="pt-BR"/>
           </a:p>
@@ -758,7 +763,7 @@
           <a:p>
             <a:fld id="{A6BC64F7-5FB0-4183-AA12-A26509D9C920}" type="datetimeFigureOut">
               <a:rPr lang="pt-BR" smtClean="0"/>
-              <a:t>11/05/2021</a:t>
+              <a:t>18/05/2021</a:t>
             </a:fld>
             <a:endParaRPr lang="pt-BR"/>
           </a:p>
@@ -1002,7 +1007,7 @@
           <a:p>
             <a:fld id="{A6BC64F7-5FB0-4183-AA12-A26509D9C920}" type="datetimeFigureOut">
               <a:rPr lang="pt-BR" smtClean="0"/>
-              <a:t>11/05/2021</a:t>
+              <a:t>18/05/2021</a:t>
             </a:fld>
             <a:endParaRPr lang="pt-BR"/>
           </a:p>
@@ -1234,7 +1239,7 @@
           <a:p>
             <a:fld id="{A6BC64F7-5FB0-4183-AA12-A26509D9C920}" type="datetimeFigureOut">
               <a:rPr lang="pt-BR" smtClean="0"/>
-              <a:t>11/05/2021</a:t>
+              <a:t>18/05/2021</a:t>
             </a:fld>
             <a:endParaRPr lang="pt-BR"/>
           </a:p>
@@ -1601,7 +1606,7 @@
           <a:p>
             <a:fld id="{A6BC64F7-5FB0-4183-AA12-A26509D9C920}" type="datetimeFigureOut">
               <a:rPr lang="pt-BR" smtClean="0"/>
-              <a:t>11/05/2021</a:t>
+              <a:t>18/05/2021</a:t>
             </a:fld>
             <a:endParaRPr lang="pt-BR"/>
           </a:p>
@@ -1719,7 +1724,7 @@
           <a:p>
             <a:fld id="{A6BC64F7-5FB0-4183-AA12-A26509D9C920}" type="datetimeFigureOut">
               <a:rPr lang="pt-BR" smtClean="0"/>
-              <a:t>11/05/2021</a:t>
+              <a:t>18/05/2021</a:t>
             </a:fld>
             <a:endParaRPr lang="pt-BR"/>
           </a:p>
@@ -1814,7 +1819,7 @@
           <a:p>
             <a:fld id="{A6BC64F7-5FB0-4183-AA12-A26509D9C920}" type="datetimeFigureOut">
               <a:rPr lang="pt-BR" smtClean="0"/>
-              <a:t>11/05/2021</a:t>
+              <a:t>18/05/2021</a:t>
             </a:fld>
             <a:endParaRPr lang="pt-BR"/>
           </a:p>
@@ -2091,7 +2096,7 @@
           <a:p>
             <a:fld id="{A6BC64F7-5FB0-4183-AA12-A26509D9C920}" type="datetimeFigureOut">
               <a:rPr lang="pt-BR" smtClean="0"/>
-              <a:t>11/05/2021</a:t>
+              <a:t>18/05/2021</a:t>
             </a:fld>
             <a:endParaRPr lang="pt-BR"/>
           </a:p>
@@ -2348,7 +2353,7 @@
           <a:p>
             <a:fld id="{A6BC64F7-5FB0-4183-AA12-A26509D9C920}" type="datetimeFigureOut">
               <a:rPr lang="pt-BR" smtClean="0"/>
-              <a:t>11/05/2021</a:t>
+              <a:t>18/05/2021</a:t>
             </a:fld>
             <a:endParaRPr lang="pt-BR"/>
           </a:p>
@@ -2561,7 +2566,7 @@
           <a:p>
             <a:fld id="{A6BC64F7-5FB0-4183-AA12-A26509D9C920}" type="datetimeFigureOut">
               <a:rPr lang="pt-BR" smtClean="0"/>
-              <a:t>11/05/2021</a:t>
+              <a:t>18/05/2021</a:t>
             </a:fld>
             <a:endParaRPr lang="pt-BR"/>
           </a:p>
@@ -2968,6 +2973,196 @@
       </p:grpSpPr>
       <p:grpSp>
         <p:nvGrpSpPr>
+          <p:cNvPr id="122" name="Agrupar 121">
+            <a:extLst>
+              <a:ext uri="{FF2B5EF4-FFF2-40B4-BE49-F238E27FC236}">
+                <a16:creationId xmlns:a16="http://schemas.microsoft.com/office/drawing/2014/main" id="{E7ADE3FF-8ACD-4DD4-8EFF-29B88CE9FE08}"/>
+              </a:ext>
+            </a:extLst>
+          </p:cNvPr>
+          <p:cNvGrpSpPr/>
+          <p:nvPr/>
+        </p:nvGrpSpPr>
+        <p:grpSpPr>
+          <a:xfrm>
+            <a:off x="238127" y="6855564"/>
+            <a:ext cx="8464666" cy="2296055"/>
+            <a:chOff x="238127" y="3878607"/>
+            <a:chExt cx="8464666" cy="4866931"/>
+          </a:xfrm>
+        </p:grpSpPr>
+        <p:sp>
+          <p:nvSpPr>
+            <p:cNvPr id="123" name="Retângulo 122">
+              <a:extLst>
+                <a:ext uri="{FF2B5EF4-FFF2-40B4-BE49-F238E27FC236}">
+                  <a16:creationId xmlns:a16="http://schemas.microsoft.com/office/drawing/2014/main" id="{EE8443BF-2673-4E3E-9F00-15D3862AD93A}"/>
+                </a:ext>
+              </a:extLst>
+            </p:cNvPr>
+            <p:cNvSpPr/>
+            <p:nvPr/>
+          </p:nvSpPr>
+          <p:spPr>
+            <a:xfrm>
+              <a:off x="724696" y="3878607"/>
+              <a:ext cx="7978097" cy="4866931"/>
+            </a:xfrm>
+            <a:prstGeom prst="rect">
+              <a:avLst/>
+            </a:prstGeom>
+            <a:solidFill>
+              <a:schemeClr val="bg1">
+                <a:lumMod val="95000"/>
+              </a:schemeClr>
+            </a:solidFill>
+            <a:ln>
+              <a:solidFill>
+                <a:schemeClr val="tx1"/>
+              </a:solidFill>
+            </a:ln>
+          </p:spPr>
+          <p:style>
+            <a:lnRef idx="2">
+              <a:schemeClr val="accent1">
+                <a:shade val="50000"/>
+              </a:schemeClr>
+            </a:lnRef>
+            <a:fillRef idx="1">
+              <a:schemeClr val="accent1"/>
+            </a:fillRef>
+            <a:effectRef idx="0">
+              <a:schemeClr val="accent1"/>
+            </a:effectRef>
+            <a:fontRef idx="minor">
+              <a:schemeClr val="lt1"/>
+            </a:fontRef>
+          </p:style>
+          <p:txBody>
+            <a:bodyPr rtlCol="0" anchor="ctr"/>
+            <a:lstStyle/>
+            <a:p>
+              <a:pPr algn="ctr"/>
+              <a:endParaRPr lang="pt-BR"/>
+            </a:p>
+          </p:txBody>
+        </p:sp>
+        <p:grpSp>
+          <p:nvGrpSpPr>
+            <p:cNvPr id="124" name="Agrupar 123">
+              <a:extLst>
+                <a:ext uri="{FF2B5EF4-FFF2-40B4-BE49-F238E27FC236}">
+                  <a16:creationId xmlns:a16="http://schemas.microsoft.com/office/drawing/2014/main" id="{2F09A8C5-E5A3-4DCD-98B5-05CF60CD7140}"/>
+                </a:ext>
+              </a:extLst>
+            </p:cNvPr>
+            <p:cNvGrpSpPr/>
+            <p:nvPr/>
+          </p:nvGrpSpPr>
+          <p:grpSpPr>
+            <a:xfrm>
+              <a:off x="238127" y="3878607"/>
+              <a:ext cx="486569" cy="4866931"/>
+              <a:chOff x="219075" y="590548"/>
+              <a:chExt cx="486569" cy="3495677"/>
+            </a:xfrm>
+          </p:grpSpPr>
+          <p:sp>
+            <p:nvSpPr>
+              <p:cNvPr id="125" name="Retângulo 124">
+                <a:extLst>
+                  <a:ext uri="{FF2B5EF4-FFF2-40B4-BE49-F238E27FC236}">
+                    <a16:creationId xmlns:a16="http://schemas.microsoft.com/office/drawing/2014/main" id="{2BFD3264-D3B7-4372-8A25-ADD9B1E48D38}"/>
+                  </a:ext>
+                </a:extLst>
+              </p:cNvPr>
+              <p:cNvSpPr/>
+              <p:nvPr/>
+            </p:nvSpPr>
+            <p:spPr>
+              <a:xfrm>
+                <a:off x="219075" y="590548"/>
+                <a:ext cx="486569" cy="3495677"/>
+              </a:xfrm>
+              <a:prstGeom prst="rect">
+                <a:avLst/>
+              </a:prstGeom>
+              <a:solidFill>
+                <a:schemeClr val="bg2">
+                  <a:lumMod val="75000"/>
+                </a:schemeClr>
+              </a:solidFill>
+              <a:ln>
+                <a:solidFill>
+                  <a:schemeClr val="tx1"/>
+                </a:solidFill>
+              </a:ln>
+            </p:spPr>
+            <p:style>
+              <a:lnRef idx="2">
+                <a:schemeClr val="accent1">
+                  <a:shade val="50000"/>
+                </a:schemeClr>
+              </a:lnRef>
+              <a:fillRef idx="1">
+                <a:schemeClr val="accent1"/>
+              </a:fillRef>
+              <a:effectRef idx="0">
+                <a:schemeClr val="accent1"/>
+              </a:effectRef>
+              <a:fontRef idx="minor">
+                <a:schemeClr val="lt1"/>
+              </a:fontRef>
+            </p:style>
+            <p:txBody>
+              <a:bodyPr rtlCol="0" anchor="ctr"/>
+              <a:lstStyle/>
+              <a:p>
+                <a:pPr algn="ctr"/>
+                <a:endParaRPr lang="pt-BR" dirty="0"/>
+              </a:p>
+            </p:txBody>
+          </p:sp>
+          <p:sp>
+            <p:nvSpPr>
+              <p:cNvPr id="126" name="CaixaDeTexto 125">
+                <a:extLst>
+                  <a:ext uri="{FF2B5EF4-FFF2-40B4-BE49-F238E27FC236}">
+                    <a16:creationId xmlns:a16="http://schemas.microsoft.com/office/drawing/2014/main" id="{BDCEB9EC-749A-4AA0-A035-90091D3C773F}"/>
+                  </a:ext>
+                </a:extLst>
+              </p:cNvPr>
+              <p:cNvSpPr txBox="1"/>
+              <p:nvPr/>
+            </p:nvSpPr>
+            <p:spPr>
+              <a:xfrm rot="16200000">
+                <a:off x="-1285478" y="2153720"/>
+                <a:ext cx="3495676" cy="369332"/>
+              </a:xfrm>
+              <a:prstGeom prst="rect">
+                <a:avLst/>
+              </a:prstGeom>
+              <a:noFill/>
+            </p:spPr>
+            <p:txBody>
+              <a:bodyPr wrap="square" rtlCol="0">
+                <a:spAutoFit/>
+              </a:bodyPr>
+              <a:lstStyle/>
+              <a:p>
+                <a:pPr algn="ctr"/>
+                <a:r>
+                  <a:rPr lang="pt-BR" dirty="0"/>
+                  <a:t>N3</a:t>
+                </a:r>
+              </a:p>
+            </p:txBody>
+          </p:sp>
+        </p:grpSp>
+      </p:grpSp>
+      <p:grpSp>
+        <p:nvGrpSpPr>
           <p:cNvPr id="22" name="Agrupar 21">
             <a:extLst>
               <a:ext uri="{FF2B5EF4-FFF2-40B4-BE49-F238E27FC236}">
@@ -2980,8 +3175,8 @@
         </p:nvGrpSpPr>
         <p:grpSpPr>
           <a:xfrm>
-            <a:off x="238127" y="3878607"/>
-            <a:ext cx="8464666" cy="4866931"/>
+            <a:off x="238127" y="4635533"/>
+            <a:ext cx="8464666" cy="2220030"/>
             <a:chOff x="238127" y="3878607"/>
             <a:chExt cx="8464666" cy="4866931"/>
           </a:xfrm>
@@ -3149,7 +3344,7 @@
                 <a:pPr algn="ctr"/>
                 <a:r>
                   <a:rPr lang="pt-BR" dirty="0"/>
-                  <a:t>Técnico</a:t>
+                  <a:t>N2</a:t>
                 </a:r>
               </a:p>
             </p:txBody>
@@ -3170,8 +3365,8 @@
         </p:nvGrpSpPr>
         <p:grpSpPr>
           <a:xfrm>
-            <a:off x="238127" y="1165223"/>
-            <a:ext cx="8464666" cy="2706701"/>
+            <a:off x="238127" y="1094633"/>
+            <a:ext cx="8464666" cy="3537294"/>
             <a:chOff x="238127" y="1165223"/>
             <a:chExt cx="8464666" cy="2706701"/>
           </a:xfrm>
@@ -3339,7 +3534,7 @@
                 <a:pPr algn="ctr"/>
                 <a:r>
                   <a:rPr lang="pt-BR" dirty="0"/>
-                  <a:t>Usuário</a:t>
+                  <a:t>N1</a:t>
                 </a:r>
               </a:p>
             </p:txBody>
@@ -3360,7 +3555,7 @@
         </p:nvSpPr>
         <p:spPr>
           <a:xfrm>
-            <a:off x="962025" y="1355726"/>
+            <a:off x="962025" y="1285137"/>
             <a:ext cx="1762124" cy="476251"/>
           </a:xfrm>
           <a:prstGeom prst="flowChartTerminator">
@@ -3426,7 +3621,7 @@
         </p:nvSpPr>
         <p:spPr>
           <a:xfrm>
-            <a:off x="1104900" y="2041525"/>
+            <a:off x="1104900" y="2686937"/>
             <a:ext cx="1476377" cy="723900"/>
           </a:xfrm>
           <a:prstGeom prst="flowChartDecision">
@@ -3490,14 +3685,14 @@
           <p:cNvCxnSpPr>
             <a:cxnSpLocks/>
             <a:stCxn id="16" idx="2"/>
-            <a:endCxn id="18" idx="0"/>
+            <a:endCxn id="68" idx="0"/>
           </p:cNvCxnSpPr>
           <p:nvPr/>
         </p:nvCxnSpPr>
         <p:spPr>
-          <a:xfrm>
-            <a:off x="1843087" y="1831975"/>
-            <a:ext cx="0" cy="209550"/>
+          <a:xfrm flipH="1">
+            <a:off x="1834874" y="1761388"/>
+            <a:ext cx="8213" cy="240047"/>
           </a:xfrm>
           <a:prstGeom prst="straightConnector1">
             <a:avLst/>
@@ -3535,7 +3730,7 @@
         </p:nvSpPr>
         <p:spPr>
           <a:xfrm>
-            <a:off x="1104900" y="2974975"/>
+            <a:off x="1104900" y="3620387"/>
             <a:ext cx="1476377" cy="723900"/>
           </a:xfrm>
           <a:prstGeom prst="flowChartDecision">
@@ -3582,7 +3777,7 @@
                   <a:schemeClr val="tx1"/>
                 </a:solidFill>
               </a:rPr>
-              <a:t>Sensor está enviando dados?</a:t>
+              <a:t>Problemas no cadastro?</a:t>
             </a:r>
           </a:p>
         </p:txBody>
@@ -3604,7 +3799,7 @@
         </p:nvCxnSpPr>
         <p:spPr>
           <a:xfrm>
-            <a:off x="1843087" y="2765425"/>
+            <a:off x="1843087" y="3410837"/>
             <a:ext cx="0" cy="209550"/>
           </a:xfrm>
           <a:prstGeom prst="straightConnector1">
@@ -3643,7 +3838,7 @@
         </p:nvSpPr>
         <p:spPr>
           <a:xfrm>
-            <a:off x="1850234" y="2739395"/>
+            <a:off x="1850234" y="3384807"/>
             <a:ext cx="732631" cy="261610"/>
           </a:xfrm>
           <a:prstGeom prst="rect">
@@ -3680,7 +3875,7 @@
         </p:nvCxnSpPr>
         <p:spPr>
           <a:xfrm>
-            <a:off x="2591594" y="2403475"/>
+            <a:off x="2591594" y="3048887"/>
             <a:ext cx="380204" cy="0"/>
           </a:xfrm>
           <a:prstGeom prst="straightConnector1">
@@ -3719,7 +3914,7 @@
         </p:nvSpPr>
         <p:spPr>
           <a:xfrm>
-            <a:off x="2547149" y="2154880"/>
+            <a:off x="2547149" y="2800292"/>
             <a:ext cx="732631" cy="261610"/>
           </a:xfrm>
           <a:prstGeom prst="rect">
@@ -3754,7 +3949,7 @@
         </p:nvSpPr>
         <p:spPr>
           <a:xfrm>
-            <a:off x="2971798" y="2154880"/>
+            <a:off x="2971798" y="2800292"/>
             <a:ext cx="1476376" cy="505770"/>
           </a:xfrm>
           <a:prstGeom prst="rect">
@@ -3801,7 +3996,7 @@
                   <a:schemeClr val="tx1"/>
                 </a:solidFill>
               </a:rPr>
-              <a:t>Verificar conexão com a internet</a:t>
+              <a:t>Verificar conexão com a internet e cabeamento</a:t>
             </a:r>
           </a:p>
         </p:txBody>
@@ -3820,7 +4015,7 @@
         </p:nvSpPr>
         <p:spPr>
           <a:xfrm>
-            <a:off x="1840707" y="3963607"/>
+            <a:off x="1782151" y="4370317"/>
             <a:ext cx="732631" cy="261610"/>
           </a:xfrm>
           <a:prstGeom prst="rect">
@@ -3841,12 +4036,53 @@
           </a:p>
         </p:txBody>
       </p:sp>
-      <p:sp>
-        <p:nvSpPr>
-          <p:cNvPr id="60" name="Retângulo 59">
+      <p:cxnSp>
+        <p:nvCxnSpPr>
+          <p:cNvPr id="69" name="Conector de Seta Reta 68">
             <a:extLst>
               <a:ext uri="{FF2B5EF4-FFF2-40B4-BE49-F238E27FC236}">
-                <a16:creationId xmlns:a16="http://schemas.microsoft.com/office/drawing/2014/main" id="{4C61DEC5-77E6-4507-9710-F1DA6F6DC39C}"/>
+                <a16:creationId xmlns:a16="http://schemas.microsoft.com/office/drawing/2014/main" id="{B0E43D43-6EE1-4A87-80B6-129F9AE865EC}"/>
+              </a:ext>
+            </a:extLst>
+          </p:cNvPr>
+          <p:cNvCxnSpPr>
+            <a:cxnSpLocks/>
+          </p:cNvCxnSpPr>
+          <p:nvPr/>
+        </p:nvCxnSpPr>
+        <p:spPr>
+          <a:xfrm>
+            <a:off x="2547149" y="8503266"/>
+            <a:ext cx="476247" cy="17"/>
+          </a:xfrm>
+          <a:prstGeom prst="straightConnector1">
+            <a:avLst/>
+          </a:prstGeom>
+          <a:ln>
+            <a:tailEnd type="triangle"/>
+          </a:ln>
+        </p:spPr>
+        <p:style>
+          <a:lnRef idx="1">
+            <a:schemeClr val="accent1"/>
+          </a:lnRef>
+          <a:fillRef idx="0">
+            <a:schemeClr val="accent1"/>
+          </a:fillRef>
+          <a:effectRef idx="0">
+            <a:schemeClr val="accent1"/>
+          </a:effectRef>
+          <a:fontRef idx="minor">
+            <a:schemeClr val="tx1"/>
+          </a:fontRef>
+        </p:style>
+      </p:cxnSp>
+      <p:sp>
+        <p:nvSpPr>
+          <p:cNvPr id="77" name="Fluxograma: Decisão 76">
+            <a:extLst>
+              <a:ext uri="{FF2B5EF4-FFF2-40B4-BE49-F238E27FC236}">
+                <a16:creationId xmlns:a16="http://schemas.microsoft.com/office/drawing/2014/main" id="{773DCD19-9830-4993-92E5-AEE17FDE0490}"/>
               </a:ext>
             </a:extLst>
           </p:cNvPr>
@@ -3855,73 +4091,7 @@
         </p:nvSpPr>
         <p:spPr>
           <a:xfrm>
-            <a:off x="1102520" y="4355154"/>
-            <a:ext cx="1476376" cy="505770"/>
-          </a:xfrm>
-          <a:prstGeom prst="rect">
-            <a:avLst/>
-          </a:prstGeom>
-          <a:solidFill>
-            <a:schemeClr val="accent1">
-              <a:lumMod val="40000"/>
-              <a:lumOff val="60000"/>
-            </a:schemeClr>
-          </a:solidFill>
-          <a:ln w="19050">
-            <a:solidFill>
-              <a:schemeClr val="accent1">
-                <a:lumMod val="75000"/>
-              </a:schemeClr>
-            </a:solidFill>
-          </a:ln>
-        </p:spPr>
-        <p:style>
-          <a:lnRef idx="2">
-            <a:schemeClr val="accent1">
-              <a:shade val="50000"/>
-            </a:schemeClr>
-          </a:lnRef>
-          <a:fillRef idx="1">
-            <a:schemeClr val="accent1"/>
-          </a:fillRef>
-          <a:effectRef idx="0">
-            <a:schemeClr val="accent1"/>
-          </a:effectRef>
-          <a:fontRef idx="minor">
-            <a:schemeClr val="lt1"/>
-          </a:fontRef>
-        </p:style>
-        <p:txBody>
-          <a:bodyPr rtlCol="0" anchor="ctr"/>
-          <a:lstStyle/>
-          <a:p>
-            <a:pPr algn="ctr"/>
-            <a:r>
-              <a:rPr lang="pt-BR" sz="900" dirty="0">
-                <a:solidFill>
-                  <a:schemeClr val="tx1"/>
-                </a:solidFill>
-              </a:rPr>
-              <a:t>Contatar Suporte</a:t>
-            </a:r>
-          </a:p>
-        </p:txBody>
-      </p:sp>
-      <p:sp>
-        <p:nvSpPr>
-          <p:cNvPr id="67" name="Fluxograma: Decisão 66">
-            <a:extLst>
-              <a:ext uri="{FF2B5EF4-FFF2-40B4-BE49-F238E27FC236}">
-                <a16:creationId xmlns:a16="http://schemas.microsoft.com/office/drawing/2014/main" id="{AC9CFC65-A8F0-4880-BE1C-319374A2A526}"/>
-              </a:ext>
-            </a:extLst>
-          </p:cNvPr>
-          <p:cNvSpPr/>
-          <p:nvPr/>
-        </p:nvSpPr>
-        <p:spPr>
-          <a:xfrm>
-            <a:off x="1104900" y="5339385"/>
+            <a:off x="4984717" y="3600669"/>
             <a:ext cx="1476377" cy="723900"/>
           </a:xfrm>
           <a:prstGeom prst="flowChartDecision">
@@ -3968,211 +4138,6 @@
                   <a:schemeClr val="tx1"/>
                 </a:solidFill>
               </a:rPr>
-              <a:t>Sensor danificado?</a:t>
-            </a:r>
-          </a:p>
-        </p:txBody>
-      </p:sp>
-      <p:cxnSp>
-        <p:nvCxnSpPr>
-          <p:cNvPr id="69" name="Conector de Seta Reta 68">
-            <a:extLst>
-              <a:ext uri="{FF2B5EF4-FFF2-40B4-BE49-F238E27FC236}">
-                <a16:creationId xmlns:a16="http://schemas.microsoft.com/office/drawing/2014/main" id="{B0E43D43-6EE1-4A87-80B6-129F9AE865EC}"/>
-              </a:ext>
-            </a:extLst>
-          </p:cNvPr>
-          <p:cNvCxnSpPr>
-            <a:cxnSpLocks/>
-            <a:stCxn id="67" idx="3"/>
-            <a:endCxn id="71" idx="1"/>
-          </p:cNvCxnSpPr>
-          <p:nvPr/>
-        </p:nvCxnSpPr>
-        <p:spPr>
-          <a:xfrm>
-            <a:off x="2581277" y="5701335"/>
-            <a:ext cx="476247" cy="17"/>
-          </a:xfrm>
-          <a:prstGeom prst="straightConnector1">
-            <a:avLst/>
-          </a:prstGeom>
-          <a:ln>
-            <a:tailEnd type="triangle"/>
-          </a:ln>
-        </p:spPr>
-        <p:style>
-          <a:lnRef idx="1">
-            <a:schemeClr val="accent1"/>
-          </a:lnRef>
-          <a:fillRef idx="0">
-            <a:schemeClr val="accent1"/>
-          </a:fillRef>
-          <a:effectRef idx="0">
-            <a:schemeClr val="accent1"/>
-          </a:effectRef>
-          <a:fontRef idx="minor">
-            <a:schemeClr val="tx1"/>
-          </a:fontRef>
-        </p:style>
-      </p:cxnSp>
-      <p:sp>
-        <p:nvSpPr>
-          <p:cNvPr id="70" name="CaixaDeTexto 69">
-            <a:extLst>
-              <a:ext uri="{FF2B5EF4-FFF2-40B4-BE49-F238E27FC236}">
-                <a16:creationId xmlns:a16="http://schemas.microsoft.com/office/drawing/2014/main" id="{227F8914-9A0F-465D-BDF6-B52A599514F4}"/>
-              </a:ext>
-            </a:extLst>
-          </p:cNvPr>
-          <p:cNvSpPr txBox="1"/>
-          <p:nvPr/>
-        </p:nvSpPr>
-        <p:spPr>
-          <a:xfrm>
-            <a:off x="2527391" y="5431486"/>
-            <a:ext cx="732631" cy="261610"/>
-          </a:xfrm>
-          <a:prstGeom prst="rect">
-            <a:avLst/>
-          </a:prstGeom>
-          <a:noFill/>
-        </p:spPr>
-        <p:txBody>
-          <a:bodyPr wrap="square" rtlCol="0">
-            <a:spAutoFit/>
-          </a:bodyPr>
-          <a:lstStyle/>
-          <a:p>
-            <a:r>
-              <a:rPr lang="pt-BR" sz="1100" b="1" dirty="0"/>
-              <a:t>Sim</a:t>
-            </a:r>
-          </a:p>
-        </p:txBody>
-      </p:sp>
-      <p:sp>
-        <p:nvSpPr>
-          <p:cNvPr id="71" name="Fluxograma: Processo Predefinido 70">
-            <a:extLst>
-              <a:ext uri="{FF2B5EF4-FFF2-40B4-BE49-F238E27FC236}">
-                <a16:creationId xmlns:a16="http://schemas.microsoft.com/office/drawing/2014/main" id="{DF6390B3-6981-439E-B711-3912015F47E2}"/>
-              </a:ext>
-            </a:extLst>
-          </p:cNvPr>
-          <p:cNvSpPr/>
-          <p:nvPr/>
-        </p:nvSpPr>
-        <p:spPr>
-          <a:xfrm>
-            <a:off x="3057524" y="5339402"/>
-            <a:ext cx="1343024" cy="723900"/>
-          </a:xfrm>
-          <a:prstGeom prst="flowChartPredefinedProcess">
-            <a:avLst/>
-          </a:prstGeom>
-          <a:solidFill>
-            <a:srgbClr val="B4C7E7"/>
-          </a:solidFill>
-          <a:ln w="19050">
-            <a:solidFill>
-              <a:srgbClr val="2F5597"/>
-            </a:solidFill>
-          </a:ln>
-        </p:spPr>
-        <p:style>
-          <a:lnRef idx="2">
-            <a:schemeClr val="accent1">
-              <a:shade val="50000"/>
-            </a:schemeClr>
-          </a:lnRef>
-          <a:fillRef idx="1">
-            <a:schemeClr val="accent1"/>
-          </a:fillRef>
-          <a:effectRef idx="0">
-            <a:schemeClr val="accent1"/>
-          </a:effectRef>
-          <a:fontRef idx="minor">
-            <a:schemeClr val="lt1"/>
-          </a:fontRef>
-        </p:style>
-        <p:txBody>
-          <a:bodyPr rtlCol="0" anchor="ctr"/>
-          <a:lstStyle/>
-          <a:p>
-            <a:pPr algn="ctr"/>
-            <a:r>
-              <a:rPr lang="pt-BR" sz="900" dirty="0">
-                <a:solidFill>
-                  <a:schemeClr val="tx1"/>
-                </a:solidFill>
-              </a:rPr>
-              <a:t>Trocar sensor</a:t>
-            </a:r>
-          </a:p>
-        </p:txBody>
-      </p:sp>
-      <p:sp>
-        <p:nvSpPr>
-          <p:cNvPr id="77" name="Fluxograma: Decisão 76">
-            <a:extLst>
-              <a:ext uri="{FF2B5EF4-FFF2-40B4-BE49-F238E27FC236}">
-                <a16:creationId xmlns:a16="http://schemas.microsoft.com/office/drawing/2014/main" id="{773DCD19-9830-4993-92E5-AEE17FDE0490}"/>
-              </a:ext>
-            </a:extLst>
-          </p:cNvPr>
-          <p:cNvSpPr/>
-          <p:nvPr/>
-        </p:nvSpPr>
-        <p:spPr>
-          <a:xfrm>
-            <a:off x="4999829" y="2972115"/>
-            <a:ext cx="1476377" cy="723900"/>
-          </a:xfrm>
-          <a:prstGeom prst="flowChartDecision">
-            <a:avLst/>
-          </a:prstGeom>
-          <a:solidFill>
-            <a:schemeClr val="accent1">
-              <a:lumMod val="40000"/>
-              <a:lumOff val="60000"/>
-            </a:schemeClr>
-          </a:solidFill>
-          <a:ln w="19050">
-            <a:solidFill>
-              <a:schemeClr val="accent1">
-                <a:lumMod val="75000"/>
-              </a:schemeClr>
-            </a:solidFill>
-          </a:ln>
-        </p:spPr>
-        <p:style>
-          <a:lnRef idx="2">
-            <a:schemeClr val="accent1">
-              <a:shade val="50000"/>
-            </a:schemeClr>
-          </a:lnRef>
-          <a:fillRef idx="1">
-            <a:schemeClr val="accent1"/>
-          </a:fillRef>
-          <a:effectRef idx="0">
-            <a:schemeClr val="accent1"/>
-          </a:effectRef>
-          <a:fontRef idx="minor">
-            <a:schemeClr val="lt1"/>
-          </a:fontRef>
-        </p:style>
-        <p:txBody>
-          <a:bodyPr rtlCol="0" anchor="ctr"/>
-          <a:lstStyle/>
-          <a:p>
-            <a:pPr algn="ctr"/>
-            <a:r>
-              <a:rPr lang="pt-BR" sz="900" dirty="0">
-                <a:solidFill>
-                  <a:schemeClr val="tx1"/>
-                </a:solidFill>
-              </a:rPr>
               <a:t>Funcionou</a:t>
             </a:r>
           </a:p>
@@ -4194,7 +4159,7 @@
         </p:nvCxnSpPr>
         <p:spPr>
           <a:xfrm>
-            <a:off x="6455537" y="3334306"/>
+            <a:off x="6455537" y="3956858"/>
             <a:ext cx="380204" cy="0"/>
           </a:xfrm>
           <a:prstGeom prst="straightConnector1">
@@ -4233,7 +4198,7 @@
         </p:nvSpPr>
         <p:spPr>
           <a:xfrm>
-            <a:off x="6413926" y="3085711"/>
+            <a:off x="6428067" y="3731597"/>
             <a:ext cx="732631" cy="261610"/>
           </a:xfrm>
           <a:prstGeom prst="rect">
@@ -4268,7 +4233,7 @@
         </p:nvSpPr>
         <p:spPr>
           <a:xfrm>
-            <a:off x="6829027" y="3104905"/>
+            <a:off x="6835741" y="3724493"/>
             <a:ext cx="1762124" cy="476251"/>
           </a:xfrm>
           <a:prstGeom prst="flowChartTerminator">
@@ -4335,9 +4300,9 @@
           <p:nvPr/>
         </p:nvCxnSpPr>
         <p:spPr>
-          <a:xfrm flipH="1">
-            <a:off x="4718791" y="2403475"/>
-            <a:ext cx="3236" cy="930707"/>
+          <a:xfrm>
+            <a:off x="4722027" y="3048887"/>
+            <a:ext cx="0" cy="917851"/>
           </a:xfrm>
           <a:prstGeom prst="line">
             <a:avLst/>
@@ -4375,54 +4340,12 @@
         </p:nvCxnSpPr>
         <p:spPr>
           <a:xfrm flipH="1">
-            <a:off x="4448174" y="2403474"/>
+            <a:off x="4448174" y="3048886"/>
             <a:ext cx="272235" cy="4291"/>
           </a:xfrm>
           <a:prstGeom prst="line">
             <a:avLst/>
           </a:prstGeom>
-        </p:spPr>
-        <p:style>
-          <a:lnRef idx="1">
-            <a:schemeClr val="accent1"/>
-          </a:lnRef>
-          <a:fillRef idx="0">
-            <a:schemeClr val="accent1"/>
-          </a:fillRef>
-          <a:effectRef idx="0">
-            <a:schemeClr val="accent1"/>
-          </a:effectRef>
-          <a:fontRef idx="minor">
-            <a:schemeClr val="tx1"/>
-          </a:fontRef>
-        </p:style>
-      </p:cxnSp>
-      <p:cxnSp>
-        <p:nvCxnSpPr>
-          <p:cNvPr id="141" name="Conector de Seta Reta 140">
-            <a:extLst>
-              <a:ext uri="{FF2B5EF4-FFF2-40B4-BE49-F238E27FC236}">
-                <a16:creationId xmlns:a16="http://schemas.microsoft.com/office/drawing/2014/main" id="{76FF279F-B6CA-4E8C-9D92-A24B960C1D42}"/>
-              </a:ext>
-            </a:extLst>
-          </p:cNvPr>
-          <p:cNvCxnSpPr>
-            <a:cxnSpLocks/>
-            <a:stCxn id="60" idx="2"/>
-          </p:cNvCxnSpPr>
-          <p:nvPr/>
-        </p:nvCxnSpPr>
-        <p:spPr>
-          <a:xfrm>
-            <a:off x="1840708" y="4860924"/>
-            <a:ext cx="0" cy="476546"/>
-          </a:xfrm>
-          <a:prstGeom prst="straightConnector1">
-            <a:avLst/>
-          </a:prstGeom>
-          <a:ln>
-            <a:tailEnd type="triangle"/>
-          </a:ln>
         </p:spPr>
         <p:style>
           <a:lnRef idx="1">
@@ -4449,15 +4372,16 @@
             </a:extLst>
           </p:cNvPr>
           <p:cNvCxnSpPr>
+            <a:cxnSpLocks/>
             <a:stCxn id="33" idx="2"/>
-            <a:endCxn id="60" idx="0"/>
+            <a:endCxn id="57" idx="0"/>
           </p:cNvCxnSpPr>
           <p:nvPr/>
         </p:nvCxnSpPr>
         <p:spPr>
-          <a:xfrm flipH="1">
-            <a:off x="1840708" y="3698875"/>
-            <a:ext cx="2381" cy="656279"/>
+          <a:xfrm>
+            <a:off x="1843089" y="4344287"/>
+            <a:ext cx="792" cy="551029"/>
           </a:xfrm>
           <a:prstGeom prst="straightConnector1">
             <a:avLst/>
@@ -4490,13 +4414,16 @@
               </a:ext>
             </a:extLst>
           </p:cNvPr>
-          <p:cNvCxnSpPr/>
+          <p:cNvCxnSpPr>
+            <a:cxnSpLocks/>
+            <a:stCxn id="90" idx="2"/>
+          </p:cNvCxnSpPr>
           <p:nvPr/>
         </p:nvCxnSpPr>
         <p:spPr>
-          <a:xfrm>
-            <a:off x="1837899" y="6061370"/>
-            <a:ext cx="0" cy="476546"/>
+          <a:xfrm flipH="1">
+            <a:off x="1821180" y="7798373"/>
+            <a:ext cx="26402" cy="438847"/>
           </a:xfrm>
           <a:prstGeom prst="straightConnector1">
             <a:avLst/>
@@ -4504,145 +4431,6 @@
           <a:ln>
             <a:tailEnd type="triangle"/>
           </a:ln>
-        </p:spPr>
-        <p:style>
-          <a:lnRef idx="1">
-            <a:schemeClr val="accent1"/>
-          </a:lnRef>
-          <a:fillRef idx="0">
-            <a:schemeClr val="accent1"/>
-          </a:fillRef>
-          <a:effectRef idx="0">
-            <a:schemeClr val="accent1"/>
-          </a:effectRef>
-          <a:fontRef idx="minor">
-            <a:schemeClr val="tx1"/>
-          </a:fontRef>
-        </p:style>
-      </p:cxnSp>
-      <p:sp>
-        <p:nvSpPr>
-          <p:cNvPr id="152" name="CaixaDeTexto 151">
-            <a:extLst>
-              <a:ext uri="{FF2B5EF4-FFF2-40B4-BE49-F238E27FC236}">
-                <a16:creationId xmlns:a16="http://schemas.microsoft.com/office/drawing/2014/main" id="{328E131A-2D7F-4226-9245-79E58D460280}"/>
-              </a:ext>
-            </a:extLst>
-          </p:cNvPr>
-          <p:cNvSpPr txBox="1"/>
-          <p:nvPr/>
-        </p:nvSpPr>
-        <p:spPr>
-          <a:xfrm>
-            <a:off x="1837899" y="6118363"/>
-            <a:ext cx="732631" cy="261610"/>
-          </a:xfrm>
-          <a:prstGeom prst="rect">
-            <a:avLst/>
-          </a:prstGeom>
-          <a:noFill/>
-        </p:spPr>
-        <p:txBody>
-          <a:bodyPr wrap="square" rtlCol="0">
-            <a:spAutoFit/>
-          </a:bodyPr>
-          <a:lstStyle/>
-          <a:p>
-            <a:r>
-              <a:rPr lang="pt-BR" sz="1100" b="1" dirty="0"/>
-              <a:t>Não</a:t>
-            </a:r>
-          </a:p>
-        </p:txBody>
-      </p:sp>
-      <p:sp>
-        <p:nvSpPr>
-          <p:cNvPr id="153" name="Retângulo 152">
-            <a:extLst>
-              <a:ext uri="{FF2B5EF4-FFF2-40B4-BE49-F238E27FC236}">
-                <a16:creationId xmlns:a16="http://schemas.microsoft.com/office/drawing/2014/main" id="{8F1FF129-271F-46FE-B20C-C6416A253612}"/>
-              </a:ext>
-            </a:extLst>
-          </p:cNvPr>
-          <p:cNvSpPr/>
-          <p:nvPr/>
-        </p:nvSpPr>
-        <p:spPr>
-          <a:xfrm>
-            <a:off x="2971798" y="3068441"/>
-            <a:ext cx="1476376" cy="505770"/>
-          </a:xfrm>
-          <a:prstGeom prst="rect">
-            <a:avLst/>
-          </a:prstGeom>
-          <a:solidFill>
-            <a:schemeClr val="accent1">
-              <a:lumMod val="40000"/>
-              <a:lumOff val="60000"/>
-            </a:schemeClr>
-          </a:solidFill>
-          <a:ln w="19050">
-            <a:solidFill>
-              <a:schemeClr val="accent1">
-                <a:lumMod val="75000"/>
-              </a:schemeClr>
-            </a:solidFill>
-          </a:ln>
-        </p:spPr>
-        <p:style>
-          <a:lnRef idx="2">
-            <a:schemeClr val="accent1">
-              <a:shade val="50000"/>
-            </a:schemeClr>
-          </a:lnRef>
-          <a:fillRef idx="1">
-            <a:schemeClr val="accent1"/>
-          </a:fillRef>
-          <a:effectRef idx="0">
-            <a:schemeClr val="accent1"/>
-          </a:effectRef>
-          <a:fontRef idx="minor">
-            <a:schemeClr val="lt1"/>
-          </a:fontRef>
-        </p:style>
-        <p:txBody>
-          <a:bodyPr rtlCol="0" anchor="ctr"/>
-          <a:lstStyle/>
-          <a:p>
-            <a:pPr algn="ctr"/>
-            <a:r>
-              <a:rPr lang="pt-BR" sz="900" dirty="0">
-                <a:solidFill>
-                  <a:schemeClr val="tx1"/>
-                </a:solidFill>
-              </a:rPr>
-              <a:t>Verificar cabeamento e atualizar página</a:t>
-            </a:r>
-          </a:p>
-        </p:txBody>
-      </p:sp>
-      <p:cxnSp>
-        <p:nvCxnSpPr>
-          <p:cNvPr id="163" name="Conector reto 162">
-            <a:extLst>
-              <a:ext uri="{FF2B5EF4-FFF2-40B4-BE49-F238E27FC236}">
-                <a16:creationId xmlns:a16="http://schemas.microsoft.com/office/drawing/2014/main" id="{2488AFC6-567C-498F-8DCC-1B0D87CC74EA}"/>
-              </a:ext>
-            </a:extLst>
-          </p:cNvPr>
-          <p:cNvCxnSpPr>
-            <a:cxnSpLocks/>
-          </p:cNvCxnSpPr>
-          <p:nvPr/>
-        </p:nvCxnSpPr>
-        <p:spPr>
-          <a:xfrm flipV="1">
-            <a:off x="2581277" y="3324540"/>
-            <a:ext cx="142872" cy="2860"/>
-          </a:xfrm>
-          <a:prstGeom prst="line">
-            <a:avLst/>
-          </a:prstGeom>
         </p:spPr>
         <p:style>
           <a:lnRef idx="1">
@@ -4670,14 +4458,15 @@
           </p:cNvPr>
           <p:cNvCxnSpPr>
             <a:cxnSpLocks/>
-            <a:endCxn id="153" idx="1"/>
+            <a:stCxn id="33" idx="3"/>
+            <a:endCxn id="71" idx="1"/>
           </p:cNvCxnSpPr>
           <p:nvPr/>
         </p:nvCxnSpPr>
         <p:spPr>
-          <a:xfrm>
-            <a:off x="2724149" y="3321326"/>
-            <a:ext cx="247649" cy="0"/>
+          <a:xfrm flipV="1">
+            <a:off x="2581277" y="3977859"/>
+            <a:ext cx="467119" cy="4478"/>
           </a:xfrm>
           <a:prstGeom prst="straightConnector1">
             <a:avLst/>
@@ -4715,7 +4504,7 @@
         </p:nvSpPr>
         <p:spPr>
           <a:xfrm>
-            <a:off x="2527392" y="3085711"/>
+            <a:off x="2527391" y="3701009"/>
             <a:ext cx="732631" cy="261610"/>
           </a:xfrm>
           <a:prstGeom prst="rect">
@@ -4747,14 +4536,13 @@
           </p:cNvPr>
           <p:cNvCxnSpPr>
             <a:cxnSpLocks/>
-            <a:stCxn id="153" idx="3"/>
           </p:cNvCxnSpPr>
           <p:nvPr/>
         </p:nvCxnSpPr>
         <p:spPr>
           <a:xfrm>
-            <a:off x="4448174" y="3321326"/>
-            <a:ext cx="551655" cy="0"/>
+            <a:off x="4400548" y="3966738"/>
+            <a:ext cx="599281" cy="0"/>
           </a:xfrm>
           <a:prstGeom prst="straightConnector1">
             <a:avLst/>
@@ -4793,9 +4581,9 @@
           <p:nvPr/>
         </p:nvCxnSpPr>
         <p:spPr>
-          <a:xfrm flipH="1" flipV="1">
-            <a:off x="5738017" y="1593852"/>
-            <a:ext cx="1" cy="1378263"/>
+          <a:xfrm flipV="1">
+            <a:off x="5722182" y="1523262"/>
+            <a:ext cx="5089" cy="2085708"/>
           </a:xfrm>
           <a:prstGeom prst="line">
             <a:avLst/>
@@ -4832,7 +4620,7 @@
         </p:nvCxnSpPr>
         <p:spPr>
           <a:xfrm flipH="1">
-            <a:off x="2724149" y="1593852"/>
+            <a:off x="2724149" y="1523263"/>
             <a:ext cx="3013868" cy="0"/>
           </a:xfrm>
           <a:prstGeom prst="straightConnector1">
@@ -4871,7 +4659,7 @@
         </p:nvSpPr>
         <p:spPr>
           <a:xfrm>
-            <a:off x="5722906" y="2737017"/>
+            <a:off x="5722906" y="3306062"/>
             <a:ext cx="732631" cy="261610"/>
           </a:xfrm>
           <a:prstGeom prst="rect">
@@ -4892,44 +4680,6 @@
           </a:p>
         </p:txBody>
       </p:sp>
-      <p:cxnSp>
-        <p:nvCxnSpPr>
-          <p:cNvPr id="7" name="Conector reto 6">
-            <a:extLst>
-              <a:ext uri="{FF2B5EF4-FFF2-40B4-BE49-F238E27FC236}">
-                <a16:creationId xmlns:a16="http://schemas.microsoft.com/office/drawing/2014/main" id="{1E43AC47-B719-4028-88B4-DCFE19BE2006}"/>
-              </a:ext>
-            </a:extLst>
-          </p:cNvPr>
-          <p:cNvCxnSpPr>
-            <a:stCxn id="71" idx="3"/>
-          </p:cNvCxnSpPr>
-          <p:nvPr/>
-        </p:nvCxnSpPr>
-        <p:spPr>
-          <a:xfrm flipV="1">
-            <a:off x="4400548" y="5693096"/>
-            <a:ext cx="1337469" cy="8256"/>
-          </a:xfrm>
-          <a:prstGeom prst="line">
-            <a:avLst/>
-          </a:prstGeom>
-        </p:spPr>
-        <p:style>
-          <a:lnRef idx="1">
-            <a:schemeClr val="accent1"/>
-          </a:lnRef>
-          <a:fillRef idx="0">
-            <a:schemeClr val="accent1"/>
-          </a:fillRef>
-          <a:effectRef idx="0">
-            <a:schemeClr val="accent1"/>
-          </a:effectRef>
-          <a:fontRef idx="minor">
-            <a:schemeClr val="tx1"/>
-          </a:fontRef>
-        </p:style>
-      </p:cxnSp>
       <p:cxnSp>
         <p:nvCxnSpPr>
           <p:cNvPr id="9" name="Conector de Seta Reta 8">
@@ -4946,9 +4696,9 @@
           <p:nvPr/>
         </p:nvCxnSpPr>
         <p:spPr>
-          <a:xfrm flipV="1">
-            <a:off x="5738017" y="3696015"/>
-            <a:ext cx="1" cy="2005320"/>
+          <a:xfrm flipH="1" flipV="1">
+            <a:off x="5722906" y="4324569"/>
+            <a:ext cx="20666" cy="4178697"/>
           </a:xfrm>
           <a:prstGeom prst="straightConnector1">
             <a:avLst/>
@@ -4986,7 +4736,7 @@
         </p:nvSpPr>
         <p:spPr>
           <a:xfrm>
-            <a:off x="1105692" y="6539489"/>
+            <a:off x="1105692" y="4895316"/>
             <a:ext cx="1476377" cy="723900"/>
           </a:xfrm>
           <a:prstGeom prst="flowChartDecision">
@@ -5033,7 +4783,7 @@
                   <a:schemeClr val="tx1"/>
                 </a:solidFill>
               </a:rPr>
-              <a:t>Problemas no cadastro?</a:t>
+              <a:t>Sensor está enviando dados?</a:t>
             </a:r>
           </a:p>
         </p:txBody>
@@ -5055,7 +4805,7 @@
         </p:nvCxnSpPr>
         <p:spPr>
           <a:xfrm>
-            <a:off x="2581277" y="6901422"/>
+            <a:off x="2581277" y="5247639"/>
             <a:ext cx="476247" cy="17"/>
           </a:xfrm>
           <a:prstGeom prst="straightConnector1">
@@ -5094,7 +4844,7 @@
         </p:nvSpPr>
         <p:spPr>
           <a:xfrm>
-            <a:off x="2527391" y="6631573"/>
+            <a:off x="2527391" y="4982630"/>
             <a:ext cx="732631" cy="261610"/>
           </a:xfrm>
           <a:prstGeom prst="rect">
@@ -5110,7 +4860,7 @@
           <a:p>
             <a:r>
               <a:rPr lang="pt-BR" sz="1100" b="1" dirty="0"/>
-              <a:t>Sim</a:t>
+              <a:t>Não</a:t>
             </a:r>
           </a:p>
         </p:txBody>
@@ -5129,7 +4879,7 @@
         </p:nvSpPr>
         <p:spPr>
           <a:xfrm>
-            <a:off x="3057524" y="6539489"/>
+            <a:off x="3057524" y="4885706"/>
             <a:ext cx="1343024" cy="723900"/>
           </a:xfrm>
           <a:prstGeom prst="flowChartPredefinedProcess">
@@ -5171,31 +4921,138 @@
                   <a:schemeClr val="tx1"/>
                 </a:solidFill>
               </a:rPr>
-              <a:t>Atualizar dados</a:t>
-            </a:r>
-          </a:p>
-        </p:txBody>
-      </p:sp>
-      <p:cxnSp>
-        <p:nvCxnSpPr>
-          <p:cNvPr id="72" name="Conector reto 71">
+              <a:t>Reiniciar aplicação</a:t>
+            </a:r>
+          </a:p>
+        </p:txBody>
+      </p:sp>
+      <p:sp>
+        <p:nvSpPr>
+          <p:cNvPr id="80" name="CaixaDeTexto 79">
             <a:extLst>
               <a:ext uri="{FF2B5EF4-FFF2-40B4-BE49-F238E27FC236}">
-                <a16:creationId xmlns:a16="http://schemas.microsoft.com/office/drawing/2014/main" id="{3EE57CFE-327E-45E5-8F82-A63DCF5F8F6E}"/>
+                <a16:creationId xmlns:a16="http://schemas.microsoft.com/office/drawing/2014/main" id="{24CA7EF3-27EC-4C76-AFD6-3569CC23B2D3}"/>
               </a:ext>
             </a:extLst>
           </p:cNvPr>
-          <p:cNvCxnSpPr/>
+          <p:cNvSpPr txBox="1"/>
+          <p:nvPr/>
+        </p:nvSpPr>
+        <p:spPr>
+          <a:xfrm>
+            <a:off x="1837899" y="5606189"/>
+            <a:ext cx="732631" cy="261610"/>
+          </a:xfrm>
+          <a:prstGeom prst="rect">
+            <a:avLst/>
+          </a:prstGeom>
+          <a:noFill/>
+        </p:spPr>
+        <p:txBody>
+          <a:bodyPr wrap="square" rtlCol="0">
+            <a:spAutoFit/>
+          </a:bodyPr>
+          <a:lstStyle/>
+          <a:p>
+            <a:r>
+              <a:rPr lang="pt-BR" sz="1100" b="1" dirty="0"/>
+              <a:t>Sim</a:t>
+            </a:r>
+          </a:p>
+        </p:txBody>
+      </p:sp>
+      <p:sp>
+        <p:nvSpPr>
+          <p:cNvPr id="68" name="Retângulo 67">
+            <a:extLst>
+              <a:ext uri="{FF2B5EF4-FFF2-40B4-BE49-F238E27FC236}">
+                <a16:creationId xmlns:a16="http://schemas.microsoft.com/office/drawing/2014/main" id="{5BB895FB-0C1C-4EB4-9294-4A3595CD059B}"/>
+              </a:ext>
+            </a:extLst>
+          </p:cNvPr>
+          <p:cNvSpPr/>
+          <p:nvPr/>
+        </p:nvSpPr>
+        <p:spPr>
+          <a:xfrm>
+            <a:off x="1096686" y="2001435"/>
+            <a:ext cx="1476376" cy="505770"/>
+          </a:xfrm>
+          <a:prstGeom prst="rect">
+            <a:avLst/>
+          </a:prstGeom>
+          <a:solidFill>
+            <a:schemeClr val="accent1">
+              <a:lumMod val="40000"/>
+              <a:lumOff val="60000"/>
+            </a:schemeClr>
+          </a:solidFill>
+          <a:ln w="19050">
+            <a:solidFill>
+              <a:schemeClr val="accent1">
+                <a:lumMod val="75000"/>
+              </a:schemeClr>
+            </a:solidFill>
+          </a:ln>
+        </p:spPr>
+        <p:style>
+          <a:lnRef idx="2">
+            <a:schemeClr val="accent1">
+              <a:shade val="50000"/>
+            </a:schemeClr>
+          </a:lnRef>
+          <a:fillRef idx="1">
+            <a:schemeClr val="accent1"/>
+          </a:fillRef>
+          <a:effectRef idx="0">
+            <a:schemeClr val="accent1"/>
+          </a:effectRef>
+          <a:fontRef idx="minor">
+            <a:schemeClr val="lt1"/>
+          </a:fontRef>
+        </p:style>
+        <p:txBody>
+          <a:bodyPr rtlCol="0" anchor="ctr"/>
+          <a:lstStyle/>
+          <a:p>
+            <a:pPr algn="ctr"/>
+            <a:r>
+              <a:rPr lang="pt-BR" sz="900" dirty="0">
+                <a:solidFill>
+                  <a:schemeClr val="tx1"/>
+                </a:solidFill>
+              </a:rPr>
+              <a:t>Registro e Documentação</a:t>
+            </a:r>
+          </a:p>
+        </p:txBody>
+      </p:sp>
+      <p:cxnSp>
+        <p:nvCxnSpPr>
+          <p:cNvPr id="75" name="Conector de Seta Reta 74">
+            <a:extLst>
+              <a:ext uri="{FF2B5EF4-FFF2-40B4-BE49-F238E27FC236}">
+                <a16:creationId xmlns:a16="http://schemas.microsoft.com/office/drawing/2014/main" id="{C7AABE9A-6B1D-4479-A9CC-0171F497E505}"/>
+              </a:ext>
+            </a:extLst>
+          </p:cNvPr>
+          <p:cNvCxnSpPr>
+            <a:cxnSpLocks/>
+            <a:stCxn id="68" idx="2"/>
+          </p:cNvCxnSpPr>
           <p:nvPr/>
         </p:nvCxnSpPr>
         <p:spPr>
-          <a:xfrm flipV="1">
-            <a:off x="4400548" y="6901422"/>
-            <a:ext cx="1337469" cy="8256"/>
-          </a:xfrm>
-          <a:prstGeom prst="line">
+          <a:xfrm>
+            <a:off x="1834874" y="2507205"/>
+            <a:ext cx="1" cy="187625"/>
+          </a:xfrm>
+          <a:prstGeom prst="straightConnector1">
             <a:avLst/>
           </a:prstGeom>
+          <a:ln>
+            <a:tailEnd type="triangle"/>
+          </a:ln>
         </p:spPr>
         <p:style>
           <a:lnRef idx="1">
@@ -5214,10 +5071,10 @@
       </p:cxnSp>
       <p:cxnSp>
         <p:nvCxnSpPr>
-          <p:cNvPr id="73" name="Conector reto 72">
+          <p:cNvPr id="82" name="Conector de Seta Reta 81">
             <a:extLst>
               <a:ext uri="{FF2B5EF4-FFF2-40B4-BE49-F238E27FC236}">
-                <a16:creationId xmlns:a16="http://schemas.microsoft.com/office/drawing/2014/main" id="{E6276163-86A4-4909-90D9-A264F4B8172C}"/>
+                <a16:creationId xmlns:a16="http://schemas.microsoft.com/office/drawing/2014/main" id="{B06E8CE1-8F6A-402C-9908-967406F9E774}"/>
               </a:ext>
             </a:extLst>
           </p:cNvPr>
@@ -5228,12 +5085,15 @@
         </p:nvCxnSpPr>
         <p:spPr>
           <a:xfrm>
-            <a:off x="5731746" y="5570908"/>
-            <a:ext cx="11828" cy="2538842"/>
-          </a:xfrm>
-          <a:prstGeom prst="line">
+            <a:off x="4400548" y="5257266"/>
+            <a:ext cx="1346200" cy="0"/>
+          </a:xfrm>
+          <a:prstGeom prst="straightConnector1">
             <a:avLst/>
           </a:prstGeom>
+          <a:ln>
+            <a:tailEnd type="triangle"/>
+          </a:ln>
         </p:spPr>
         <p:style>
           <a:lnRef idx="1">
@@ -5252,20 +5112,24 @@
       </p:cxnSp>
       <p:cxnSp>
         <p:nvCxnSpPr>
-          <p:cNvPr id="74" name="Conector de Seta Reta 73">
+          <p:cNvPr id="83" name="Conector de Seta Reta 82">
             <a:extLst>
               <a:ext uri="{FF2B5EF4-FFF2-40B4-BE49-F238E27FC236}">
-                <a16:creationId xmlns:a16="http://schemas.microsoft.com/office/drawing/2014/main" id="{DA8C4B2E-8790-4A81-AE21-C854B5FFB363}"/>
+                <a16:creationId xmlns:a16="http://schemas.microsoft.com/office/drawing/2014/main" id="{17A789DA-9252-46A0-BDE4-AA3B8DD3359D}"/>
               </a:ext>
             </a:extLst>
           </p:cNvPr>
-          <p:cNvCxnSpPr/>
+          <p:cNvCxnSpPr>
+            <a:cxnSpLocks/>
+            <a:stCxn id="81" idx="2"/>
+            <a:endCxn id="90" idx="0"/>
+          </p:cNvCxnSpPr>
           <p:nvPr/>
         </p:nvCxnSpPr>
         <p:spPr>
           <a:xfrm>
-            <a:off x="1837899" y="7266813"/>
-            <a:ext cx="0" cy="476546"/>
+            <a:off x="1843881" y="6573797"/>
+            <a:ext cx="3701" cy="500676"/>
           </a:xfrm>
           <a:prstGeom prst="straightConnector1">
             <a:avLst/>
@@ -5291,10 +5155,10 @@
       </p:cxnSp>
       <p:sp>
         <p:nvSpPr>
-          <p:cNvPr id="76" name="Fluxograma: Processo Predefinido 75">
+          <p:cNvPr id="90" name="Fluxograma: Decisão 89">
             <a:extLst>
               <a:ext uri="{FF2B5EF4-FFF2-40B4-BE49-F238E27FC236}">
-                <a16:creationId xmlns:a16="http://schemas.microsoft.com/office/drawing/2014/main" id="{56D6A018-A312-40C0-841D-76CDFAAC1AEF}"/>
+                <a16:creationId xmlns:a16="http://schemas.microsoft.com/office/drawing/2014/main" id="{D9F32F10-27D7-4A0B-A4B1-E68AD40DBEF1}"/>
               </a:ext>
             </a:extLst>
           </p:cNvPr>
@@ -5303,7 +5167,73 @@
         </p:nvSpPr>
         <p:spPr>
           <a:xfrm>
-            <a:off x="1166387" y="7753758"/>
+            <a:off x="1051082" y="7074473"/>
+            <a:ext cx="1592999" cy="723900"/>
+          </a:xfrm>
+          <a:prstGeom prst="flowChartDecision">
+            <a:avLst/>
+          </a:prstGeom>
+          <a:solidFill>
+            <a:schemeClr val="accent1">
+              <a:lumMod val="40000"/>
+              <a:lumOff val="60000"/>
+            </a:schemeClr>
+          </a:solidFill>
+          <a:ln w="19050">
+            <a:solidFill>
+              <a:schemeClr val="accent1">
+                <a:lumMod val="75000"/>
+              </a:schemeClr>
+            </a:solidFill>
+          </a:ln>
+        </p:spPr>
+        <p:style>
+          <a:lnRef idx="2">
+            <a:schemeClr val="accent1">
+              <a:shade val="50000"/>
+            </a:schemeClr>
+          </a:lnRef>
+          <a:fillRef idx="1">
+            <a:schemeClr val="accent1"/>
+          </a:fillRef>
+          <a:effectRef idx="0">
+            <a:schemeClr val="accent1"/>
+          </a:effectRef>
+          <a:fontRef idx="minor">
+            <a:schemeClr val="lt1"/>
+          </a:fontRef>
+        </p:style>
+        <p:txBody>
+          <a:bodyPr rtlCol="0" anchor="ctr"/>
+          <a:lstStyle/>
+          <a:p>
+            <a:pPr algn="ctr"/>
+            <a:r>
+              <a:rPr lang="pt-BR" sz="900" dirty="0">
+                <a:solidFill>
+                  <a:schemeClr val="tx1"/>
+                </a:solidFill>
+              </a:rPr>
+              <a:t>Periféricos danificados</a:t>
+            </a:r>
+          </a:p>
+        </p:txBody>
+      </p:sp>
+      <p:sp>
+        <p:nvSpPr>
+          <p:cNvPr id="92" name="Fluxograma: Processo Predefinido 91">
+            <a:extLst>
+              <a:ext uri="{FF2B5EF4-FFF2-40B4-BE49-F238E27FC236}">
+                <a16:creationId xmlns:a16="http://schemas.microsoft.com/office/drawing/2014/main" id="{A3F50D67-B81B-47B5-BCD5-2B7647E0487E}"/>
+              </a:ext>
+            </a:extLst>
+          </p:cNvPr>
+          <p:cNvSpPr/>
+          <p:nvPr/>
+        </p:nvSpPr>
+        <p:spPr>
+          <a:xfrm>
+            <a:off x="3023714" y="8145953"/>
             <a:ext cx="1343024" cy="723900"/>
           </a:xfrm>
           <a:prstGeom prst="flowChartPredefinedProcess">
@@ -5345,90 +5275,17 @@
                   <a:schemeClr val="tx1"/>
                 </a:solidFill>
               </a:rPr>
-              <a:t>Solicitar técnico no cliente</a:t>
-            </a:r>
-          </a:p>
-        </p:txBody>
-      </p:sp>
-      <p:sp>
-        <p:nvSpPr>
-          <p:cNvPr id="80" name="CaixaDeTexto 79">
+              <a:t>Trocar sensor e derivados</a:t>
+            </a:r>
+          </a:p>
+        </p:txBody>
+      </p:sp>
+      <p:sp>
+        <p:nvSpPr>
+          <p:cNvPr id="130" name="Retângulo 129">
             <a:extLst>
               <a:ext uri="{FF2B5EF4-FFF2-40B4-BE49-F238E27FC236}">
-                <a16:creationId xmlns:a16="http://schemas.microsoft.com/office/drawing/2014/main" id="{24CA7EF3-27EC-4C76-AFD6-3569CC23B2D3}"/>
-              </a:ext>
-            </a:extLst>
-          </p:cNvPr>
-          <p:cNvSpPr txBox="1"/>
-          <p:nvPr/>
-        </p:nvSpPr>
-        <p:spPr>
-          <a:xfrm>
-            <a:off x="1837899" y="7356945"/>
-            <a:ext cx="732631" cy="261610"/>
-          </a:xfrm>
-          <a:prstGeom prst="rect">
-            <a:avLst/>
-          </a:prstGeom>
-          <a:noFill/>
-        </p:spPr>
-        <p:txBody>
-          <a:bodyPr wrap="square" rtlCol="0">
-            <a:spAutoFit/>
-          </a:bodyPr>
-          <a:lstStyle/>
-          <a:p>
-            <a:r>
-              <a:rPr lang="pt-BR" sz="1100" b="1" dirty="0"/>
-              <a:t>Não</a:t>
-            </a:r>
-          </a:p>
-        </p:txBody>
-      </p:sp>
-      <p:cxnSp>
-        <p:nvCxnSpPr>
-          <p:cNvPr id="81" name="Conector reto 80">
-            <a:extLst>
-              <a:ext uri="{FF2B5EF4-FFF2-40B4-BE49-F238E27FC236}">
-                <a16:creationId xmlns:a16="http://schemas.microsoft.com/office/drawing/2014/main" id="{9EBD1979-A649-4129-BA70-9A7249FF3F91}"/>
-              </a:ext>
-            </a:extLst>
-          </p:cNvPr>
-          <p:cNvCxnSpPr>
-            <a:cxnSpLocks/>
-          </p:cNvCxnSpPr>
-          <p:nvPr/>
-        </p:nvCxnSpPr>
-        <p:spPr>
-          <a:xfrm flipV="1">
-            <a:off x="2483917" y="8101526"/>
-            <a:ext cx="3256085" cy="22438"/>
-          </a:xfrm>
-          <a:prstGeom prst="line">
-            <a:avLst/>
-          </a:prstGeom>
-        </p:spPr>
-        <p:style>
-          <a:lnRef idx="1">
-            <a:schemeClr val="accent1"/>
-          </a:lnRef>
-          <a:fillRef idx="0">
-            <a:schemeClr val="accent1"/>
-          </a:fillRef>
-          <a:effectRef idx="0">
-            <a:schemeClr val="accent1"/>
-          </a:effectRef>
-          <a:fontRef idx="minor">
-            <a:schemeClr val="tx1"/>
-          </a:fontRef>
-        </p:style>
-      </p:cxnSp>
-      <p:sp>
-        <p:nvSpPr>
-          <p:cNvPr id="19" name="Retângulo 18">
-            <a:extLst>
-              <a:ext uri="{FF2B5EF4-FFF2-40B4-BE49-F238E27FC236}">
-                <a16:creationId xmlns:a16="http://schemas.microsoft.com/office/drawing/2014/main" id="{EAECC83D-CB96-47F9-9631-C6B9E2C83F8C}"/>
+                <a16:creationId xmlns:a16="http://schemas.microsoft.com/office/drawing/2014/main" id="{695AD63B-456C-4FD5-B763-55BB6005A602}"/>
               </a:ext>
             </a:extLst>
           </p:cNvPr>
@@ -5471,10 +5328,497 @@
           </a:p>
         </p:txBody>
       </p:sp>
+      <p:sp>
+        <p:nvSpPr>
+          <p:cNvPr id="71" name="Fluxograma: Processo Predefinido 70">
+            <a:extLst>
+              <a:ext uri="{FF2B5EF4-FFF2-40B4-BE49-F238E27FC236}">
+                <a16:creationId xmlns:a16="http://schemas.microsoft.com/office/drawing/2014/main" id="{4D7346D6-A224-49DE-B5E7-B74245448F80}"/>
+              </a:ext>
+            </a:extLst>
+          </p:cNvPr>
+          <p:cNvSpPr/>
+          <p:nvPr/>
+        </p:nvSpPr>
+        <p:spPr>
+          <a:xfrm>
+            <a:off x="3048396" y="3615909"/>
+            <a:ext cx="1343024" cy="723900"/>
+          </a:xfrm>
+          <a:prstGeom prst="flowChartPredefinedProcess">
+            <a:avLst/>
+          </a:prstGeom>
+          <a:solidFill>
+            <a:srgbClr val="B4C7E7"/>
+          </a:solidFill>
+          <a:ln w="19050">
+            <a:solidFill>
+              <a:srgbClr val="2F5597"/>
+            </a:solidFill>
+          </a:ln>
+        </p:spPr>
+        <p:style>
+          <a:lnRef idx="2">
+            <a:schemeClr val="accent1">
+              <a:shade val="50000"/>
+            </a:schemeClr>
+          </a:lnRef>
+          <a:fillRef idx="1">
+            <a:schemeClr val="accent1"/>
+          </a:fillRef>
+          <a:effectRef idx="0">
+            <a:schemeClr val="accent1"/>
+          </a:effectRef>
+          <a:fontRef idx="minor">
+            <a:schemeClr val="lt1"/>
+          </a:fontRef>
+        </p:style>
+        <p:txBody>
+          <a:bodyPr rtlCol="0" anchor="ctr"/>
+          <a:lstStyle/>
+          <a:p>
+            <a:pPr algn="ctr"/>
+            <a:r>
+              <a:rPr lang="pt-BR" sz="900" dirty="0">
+                <a:solidFill>
+                  <a:schemeClr val="tx1"/>
+                </a:solidFill>
+              </a:rPr>
+              <a:t>Atualizar dados</a:t>
+            </a:r>
+          </a:p>
+        </p:txBody>
+      </p:sp>
+      <p:sp>
+        <p:nvSpPr>
+          <p:cNvPr id="73" name="Fluxograma: Processo Predefinido 72">
+            <a:extLst>
+              <a:ext uri="{FF2B5EF4-FFF2-40B4-BE49-F238E27FC236}">
+                <a16:creationId xmlns:a16="http://schemas.microsoft.com/office/drawing/2014/main" id="{76D44E85-BF67-4C2D-9656-F775D21B107D}"/>
+              </a:ext>
+            </a:extLst>
+          </p:cNvPr>
+          <p:cNvSpPr/>
+          <p:nvPr/>
+        </p:nvSpPr>
+        <p:spPr>
+          <a:xfrm>
+            <a:off x="3057524" y="5858857"/>
+            <a:ext cx="1343024" cy="723900"/>
+          </a:xfrm>
+          <a:prstGeom prst="flowChartPredefinedProcess">
+            <a:avLst/>
+          </a:prstGeom>
+          <a:solidFill>
+            <a:srgbClr val="B4C7E7"/>
+          </a:solidFill>
+          <a:ln w="19050">
+            <a:solidFill>
+              <a:srgbClr val="2F5597"/>
+            </a:solidFill>
+          </a:ln>
+        </p:spPr>
+        <p:style>
+          <a:lnRef idx="2">
+            <a:schemeClr val="accent1">
+              <a:shade val="50000"/>
+            </a:schemeClr>
+          </a:lnRef>
+          <a:fillRef idx="1">
+            <a:schemeClr val="accent1"/>
+          </a:fillRef>
+          <a:effectRef idx="0">
+            <a:schemeClr val="accent1"/>
+          </a:effectRef>
+          <a:fontRef idx="minor">
+            <a:schemeClr val="lt1"/>
+          </a:fontRef>
+        </p:style>
+        <p:txBody>
+          <a:bodyPr rtlCol="0" anchor="ctr"/>
+          <a:lstStyle/>
+          <a:p>
+            <a:pPr algn="ctr"/>
+            <a:r>
+              <a:rPr lang="pt-BR" sz="900" dirty="0">
+                <a:solidFill>
+                  <a:schemeClr val="tx1"/>
+                </a:solidFill>
+              </a:rPr>
+              <a:t>Atualizar a aplicação</a:t>
+            </a:r>
+          </a:p>
+        </p:txBody>
+      </p:sp>
+      <p:cxnSp>
+        <p:nvCxnSpPr>
+          <p:cNvPr id="12" name="Conector de Seta Reta 11">
+            <a:extLst>
+              <a:ext uri="{FF2B5EF4-FFF2-40B4-BE49-F238E27FC236}">
+                <a16:creationId xmlns:a16="http://schemas.microsoft.com/office/drawing/2014/main" id="{596A6938-CD63-4158-9A7B-A948E790CABB}"/>
+              </a:ext>
+            </a:extLst>
+          </p:cNvPr>
+          <p:cNvCxnSpPr>
+            <a:stCxn id="73" idx="0"/>
+            <a:endCxn id="66" idx="2"/>
+          </p:cNvCxnSpPr>
+          <p:nvPr/>
+        </p:nvCxnSpPr>
+        <p:spPr>
+          <a:xfrm flipV="1">
+            <a:off x="3729036" y="5609606"/>
+            <a:ext cx="0" cy="249251"/>
+          </a:xfrm>
+          <a:prstGeom prst="straightConnector1">
+            <a:avLst/>
+          </a:prstGeom>
+          <a:ln>
+            <a:tailEnd type="triangle"/>
+          </a:ln>
+        </p:spPr>
+        <p:style>
+          <a:lnRef idx="1">
+            <a:schemeClr val="accent1"/>
+          </a:lnRef>
+          <a:fillRef idx="0">
+            <a:schemeClr val="accent1"/>
+          </a:fillRef>
+          <a:effectRef idx="0">
+            <a:schemeClr val="accent1"/>
+          </a:effectRef>
+          <a:fontRef idx="minor">
+            <a:schemeClr val="tx1"/>
+          </a:fontRef>
+        </p:style>
+      </p:cxnSp>
+      <p:sp>
+        <p:nvSpPr>
+          <p:cNvPr id="81" name="Fluxograma: Decisão 80">
+            <a:extLst>
+              <a:ext uri="{FF2B5EF4-FFF2-40B4-BE49-F238E27FC236}">
+                <a16:creationId xmlns:a16="http://schemas.microsoft.com/office/drawing/2014/main" id="{23688BEE-37DF-415B-8D3E-C4AE3B2F785F}"/>
+              </a:ext>
+            </a:extLst>
+          </p:cNvPr>
+          <p:cNvSpPr/>
+          <p:nvPr/>
+        </p:nvSpPr>
+        <p:spPr>
+          <a:xfrm>
+            <a:off x="1105692" y="5849897"/>
+            <a:ext cx="1476377" cy="723900"/>
+          </a:xfrm>
+          <a:prstGeom prst="flowChartDecision">
+            <a:avLst/>
+          </a:prstGeom>
+          <a:solidFill>
+            <a:schemeClr val="accent1">
+              <a:lumMod val="40000"/>
+              <a:lumOff val="60000"/>
+            </a:schemeClr>
+          </a:solidFill>
+          <a:ln w="19050">
+            <a:solidFill>
+              <a:schemeClr val="accent1">
+                <a:lumMod val="75000"/>
+              </a:schemeClr>
+            </a:solidFill>
+          </a:ln>
+        </p:spPr>
+        <p:style>
+          <a:lnRef idx="2">
+            <a:schemeClr val="accent1">
+              <a:shade val="50000"/>
+            </a:schemeClr>
+          </a:lnRef>
+          <a:fillRef idx="1">
+            <a:schemeClr val="accent1"/>
+          </a:fillRef>
+          <a:effectRef idx="0">
+            <a:schemeClr val="accent1"/>
+          </a:effectRef>
+          <a:fontRef idx="minor">
+            <a:schemeClr val="lt1"/>
+          </a:fontRef>
+        </p:style>
+        <p:txBody>
+          <a:bodyPr rtlCol="0" anchor="ctr"/>
+          <a:lstStyle/>
+          <a:p>
+            <a:pPr algn="ctr"/>
+            <a:r>
+              <a:rPr lang="pt-BR" sz="900" dirty="0">
+                <a:solidFill>
+                  <a:schemeClr val="tx1"/>
+                </a:solidFill>
+              </a:rPr>
+              <a:t>Sensor está recebendo dados?</a:t>
+            </a:r>
+          </a:p>
+        </p:txBody>
+      </p:sp>
+      <p:cxnSp>
+        <p:nvCxnSpPr>
+          <p:cNvPr id="84" name="Conector de Seta Reta 83">
+            <a:extLst>
+              <a:ext uri="{FF2B5EF4-FFF2-40B4-BE49-F238E27FC236}">
+                <a16:creationId xmlns:a16="http://schemas.microsoft.com/office/drawing/2014/main" id="{64374F5D-A9E1-41B3-AF81-A30F02BC4C26}"/>
+              </a:ext>
+            </a:extLst>
+          </p:cNvPr>
+          <p:cNvCxnSpPr>
+            <a:cxnSpLocks/>
+            <a:endCxn id="81" idx="0"/>
+          </p:cNvCxnSpPr>
+          <p:nvPr/>
+        </p:nvCxnSpPr>
+        <p:spPr>
+          <a:xfrm>
+            <a:off x="1843881" y="5608013"/>
+            <a:ext cx="0" cy="241884"/>
+          </a:xfrm>
+          <a:prstGeom prst="straightConnector1">
+            <a:avLst/>
+          </a:prstGeom>
+          <a:ln>
+            <a:tailEnd type="triangle"/>
+          </a:ln>
+        </p:spPr>
+        <p:style>
+          <a:lnRef idx="1">
+            <a:schemeClr val="accent1"/>
+          </a:lnRef>
+          <a:fillRef idx="0">
+            <a:schemeClr val="accent1"/>
+          </a:fillRef>
+          <a:effectRef idx="0">
+            <a:schemeClr val="accent1"/>
+          </a:effectRef>
+          <a:fontRef idx="minor">
+            <a:schemeClr val="tx1"/>
+          </a:fontRef>
+        </p:style>
+      </p:cxnSp>
+      <p:cxnSp>
+        <p:nvCxnSpPr>
+          <p:cNvPr id="85" name="Conector de Seta Reta 84">
+            <a:extLst>
+              <a:ext uri="{FF2B5EF4-FFF2-40B4-BE49-F238E27FC236}">
+                <a16:creationId xmlns:a16="http://schemas.microsoft.com/office/drawing/2014/main" id="{524C41D2-9EBF-4A95-BD6C-E02119423C6E}"/>
+              </a:ext>
+            </a:extLst>
+          </p:cNvPr>
+          <p:cNvCxnSpPr>
+            <a:cxnSpLocks/>
+          </p:cNvCxnSpPr>
+          <p:nvPr/>
+        </p:nvCxnSpPr>
+        <p:spPr>
+          <a:xfrm>
+            <a:off x="2581277" y="6211830"/>
+            <a:ext cx="476247" cy="17"/>
+          </a:xfrm>
+          <a:prstGeom prst="straightConnector1">
+            <a:avLst/>
+          </a:prstGeom>
+          <a:ln>
+            <a:tailEnd type="triangle"/>
+          </a:ln>
+        </p:spPr>
+        <p:style>
+          <a:lnRef idx="1">
+            <a:schemeClr val="accent1"/>
+          </a:lnRef>
+          <a:fillRef idx="0">
+            <a:schemeClr val="accent1"/>
+          </a:fillRef>
+          <a:effectRef idx="0">
+            <a:schemeClr val="accent1"/>
+          </a:effectRef>
+          <a:fontRef idx="minor">
+            <a:schemeClr val="tx1"/>
+          </a:fontRef>
+        </p:style>
+      </p:cxnSp>
+      <p:sp>
+        <p:nvSpPr>
+          <p:cNvPr id="86" name="CaixaDeTexto 85">
+            <a:extLst>
+              <a:ext uri="{FF2B5EF4-FFF2-40B4-BE49-F238E27FC236}">
+                <a16:creationId xmlns:a16="http://schemas.microsoft.com/office/drawing/2014/main" id="{6E3E5447-F2F7-474F-8EAD-75C5FDCBF73D}"/>
+              </a:ext>
+            </a:extLst>
+          </p:cNvPr>
+          <p:cNvSpPr txBox="1"/>
+          <p:nvPr/>
+        </p:nvSpPr>
+        <p:spPr>
+          <a:xfrm>
+            <a:off x="2527391" y="5967675"/>
+            <a:ext cx="732631" cy="261610"/>
+          </a:xfrm>
+          <a:prstGeom prst="rect">
+            <a:avLst/>
+          </a:prstGeom>
+          <a:noFill/>
+        </p:spPr>
+        <p:txBody>
+          <a:bodyPr wrap="square" rtlCol="0">
+            <a:spAutoFit/>
+          </a:bodyPr>
+          <a:lstStyle/>
+          <a:p>
+            <a:r>
+              <a:rPr lang="pt-BR" sz="1100" b="1" dirty="0"/>
+              <a:t>Não</a:t>
+            </a:r>
+          </a:p>
+        </p:txBody>
+      </p:sp>
+      <p:sp>
+        <p:nvSpPr>
+          <p:cNvPr id="87" name="CaixaDeTexto 86">
+            <a:extLst>
+              <a:ext uri="{FF2B5EF4-FFF2-40B4-BE49-F238E27FC236}">
+                <a16:creationId xmlns:a16="http://schemas.microsoft.com/office/drawing/2014/main" id="{B68DB1AD-5764-45C4-B5AE-3F1329DF364F}"/>
+              </a:ext>
+            </a:extLst>
+          </p:cNvPr>
+          <p:cNvSpPr txBox="1"/>
+          <p:nvPr/>
+        </p:nvSpPr>
+        <p:spPr>
+          <a:xfrm>
+            <a:off x="1837899" y="6591234"/>
+            <a:ext cx="732631" cy="261610"/>
+          </a:xfrm>
+          <a:prstGeom prst="rect">
+            <a:avLst/>
+          </a:prstGeom>
+          <a:noFill/>
+        </p:spPr>
+        <p:txBody>
+          <a:bodyPr wrap="square" rtlCol="0">
+            <a:spAutoFit/>
+          </a:bodyPr>
+          <a:lstStyle/>
+          <a:p>
+            <a:r>
+              <a:rPr lang="pt-BR" sz="1100" b="1" dirty="0"/>
+              <a:t>Sim</a:t>
+            </a:r>
+          </a:p>
+        </p:txBody>
+      </p:sp>
+      <p:sp>
+        <p:nvSpPr>
+          <p:cNvPr id="89" name="Retângulo 88">
+            <a:extLst>
+              <a:ext uri="{FF2B5EF4-FFF2-40B4-BE49-F238E27FC236}">
+                <a16:creationId xmlns:a16="http://schemas.microsoft.com/office/drawing/2014/main" id="{522AD900-D3B8-406E-8C5C-757E4A7E0534}"/>
+              </a:ext>
+            </a:extLst>
+          </p:cNvPr>
+          <p:cNvSpPr/>
+          <p:nvPr/>
+        </p:nvSpPr>
+        <p:spPr>
+          <a:xfrm>
+            <a:off x="1109394" y="8260934"/>
+            <a:ext cx="1476376" cy="505770"/>
+          </a:xfrm>
+          <a:prstGeom prst="rect">
+            <a:avLst/>
+          </a:prstGeom>
+          <a:solidFill>
+            <a:schemeClr val="accent1">
+              <a:lumMod val="40000"/>
+              <a:lumOff val="60000"/>
+            </a:schemeClr>
+          </a:solidFill>
+          <a:ln w="19050">
+            <a:solidFill>
+              <a:schemeClr val="accent1">
+                <a:lumMod val="75000"/>
+              </a:schemeClr>
+            </a:solidFill>
+          </a:ln>
+        </p:spPr>
+        <p:style>
+          <a:lnRef idx="2">
+            <a:schemeClr val="accent1">
+              <a:shade val="50000"/>
+            </a:schemeClr>
+          </a:lnRef>
+          <a:fillRef idx="1">
+            <a:schemeClr val="accent1"/>
+          </a:fillRef>
+          <a:effectRef idx="0">
+            <a:schemeClr val="accent1"/>
+          </a:effectRef>
+          <a:fontRef idx="minor">
+            <a:schemeClr val="lt1"/>
+          </a:fontRef>
+        </p:style>
+        <p:txBody>
+          <a:bodyPr rtlCol="0" anchor="ctr"/>
+          <a:lstStyle/>
+          <a:p>
+            <a:pPr algn="ctr"/>
+            <a:r>
+              <a:rPr lang="pt-BR" sz="900" dirty="0">
+                <a:solidFill>
+                  <a:schemeClr val="tx1"/>
+                </a:solidFill>
+              </a:rPr>
+              <a:t>Técnico no Cliente</a:t>
+            </a:r>
+          </a:p>
+        </p:txBody>
+      </p:sp>
+      <p:cxnSp>
+        <p:nvCxnSpPr>
+          <p:cNvPr id="30" name="Conector reto 29">
+            <a:extLst>
+              <a:ext uri="{FF2B5EF4-FFF2-40B4-BE49-F238E27FC236}">
+                <a16:creationId xmlns:a16="http://schemas.microsoft.com/office/drawing/2014/main" id="{368E01C5-C9A3-4D3E-91A6-9A88CDA6CFA0}"/>
+              </a:ext>
+            </a:extLst>
+          </p:cNvPr>
+          <p:cNvCxnSpPr>
+            <a:stCxn id="92" idx="3"/>
+          </p:cNvCxnSpPr>
+          <p:nvPr/>
+        </p:nvCxnSpPr>
+        <p:spPr>
+          <a:xfrm flipV="1">
+            <a:off x="4366738" y="8503266"/>
+            <a:ext cx="1380010" cy="4637"/>
+          </a:xfrm>
+          <a:prstGeom prst="line">
+            <a:avLst/>
+          </a:prstGeom>
+        </p:spPr>
+        <p:style>
+          <a:lnRef idx="1">
+            <a:schemeClr val="accent1"/>
+          </a:lnRef>
+          <a:fillRef idx="0">
+            <a:schemeClr val="accent1"/>
+          </a:fillRef>
+          <a:effectRef idx="0">
+            <a:schemeClr val="accent1"/>
+          </a:effectRef>
+          <a:fontRef idx="minor">
+            <a:schemeClr val="tx1"/>
+          </a:fontRef>
+        </p:style>
+      </p:cxnSp>
     </p:spTree>
     <p:extLst>
       <p:ext uri="{BB962C8B-B14F-4D97-AF65-F5344CB8AC3E}">
-        <p14:creationId xmlns:p14="http://schemas.microsoft.com/office/powerpoint/2010/main" val="117826146"/>
+        <p14:creationId xmlns:p14="http://schemas.microsoft.com/office/powerpoint/2010/main" val="1983195181"/>
       </p:ext>
     </p:extLst>
   </p:cSld>

</xml_diff>